<commit_message>
update frontend in compiler readme.md
</commit_message>
<xml_diff>
--- a/Compiler/04.FrontendOpt/07.cse.pptx
+++ b/Compiler/04.FrontendOpt/07.cse.pptx
@@ -10,10 +10,10 @@
     <p:sldMasterId id="2147483881" r:id="rId6"/>
   </p:sldMasterIdLst>
   <p:notesMasterIdLst>
-    <p:notesMasterId r:id="rId14"/>
+    <p:notesMasterId r:id="rId26"/>
   </p:notesMasterIdLst>
   <p:handoutMasterIdLst>
-    <p:handoutMasterId r:id="rId15"/>
+    <p:handoutMasterId r:id="rId27"/>
   </p:handoutMasterIdLst>
   <p:sldIdLst>
     <p:sldId id="1779" r:id="rId7"/>
@@ -21,13 +21,25 @@
     <p:sldId id="1798" r:id="rId9"/>
     <p:sldId id="2040" r:id="rId10"/>
     <p:sldId id="2036" r:id="rId11"/>
-    <p:sldId id="1998" r:id="rId12"/>
-    <p:sldId id="680" r:id="rId13"/>
+    <p:sldId id="2042" r:id="rId12"/>
+    <p:sldId id="2044" r:id="rId13"/>
+    <p:sldId id="2045" r:id="rId14"/>
+    <p:sldId id="2046" r:id="rId15"/>
+    <p:sldId id="2047" r:id="rId16"/>
+    <p:sldId id="2049" r:id="rId17"/>
+    <p:sldId id="2048" r:id="rId18"/>
+    <p:sldId id="2043" r:id="rId19"/>
+    <p:sldId id="2051" r:id="rId20"/>
+    <p:sldId id="2053" r:id="rId21"/>
+    <p:sldId id="2041" r:id="rId22"/>
+    <p:sldId id="2052" r:id="rId23"/>
+    <p:sldId id="1998" r:id="rId24"/>
+    <p:sldId id="680" r:id="rId25"/>
   </p:sldIdLst>
   <p:sldSz cx="12196763" cy="6858000"/>
   <p:notesSz cx="6805613" cy="9939338"/>
   <p:custDataLst>
-    <p:tags r:id="rId16"/>
+    <p:tags r:id="rId28"/>
   </p:custDataLst>
   <p:defaultTextStyle>
     <a:defPPr>
@@ -557,7 +569,7 @@
             <a:fld id="{C45443A1-D8F2-48CD-A659-3CEDBA8DF541}" type="datetimeFigureOut">
               <a:rPr lang="zh-CN" altLang="en-US" smtClean="0"/>
               <a:pPr/>
-              <a:t>2022/12/16</a:t>
+              <a:t>2022/12/19</a:t>
             </a:fld>
             <a:endParaRPr lang="zh-CN" altLang="en-US"/>
           </a:p>
@@ -877,7 +889,7 @@
                 </a:solidFill>
               </a:rPr>
               <a:pPr/>
-              <a:t>7</a:t>
+              <a:t>19</a:t>
             </a:fld>
             <a:endParaRPr lang="en-US" altLang="zh-CN">
               <a:solidFill>
@@ -924,7 +936,7 @@
                 <a:ea typeface="MS PGothic" pitchFamily="34" charset="-128"/>
               </a:rPr>
               <a:pPr algn="r" defTabSz="931863" eaLnBrk="0" hangingPunct="0"/>
-              <a:t>7</a:t>
+              <a:t>19</a:t>
             </a:fld>
             <a:endParaRPr lang="en-US" altLang="zh-CN" sz="1200">
               <a:solidFill>
@@ -38516,6 +38528,2685 @@
 </p:sld>
 </file>
 
+<file path=ppt/slides/slide10.xml><?xml version="1.0" encoding="utf-8"?>
+<p:sld xmlns:a="http://schemas.openxmlformats.org/drawingml/2006/main" xmlns:r="http://schemas.openxmlformats.org/officeDocument/2006/relationships" xmlns:p="http://schemas.openxmlformats.org/presentationml/2006/main">
+  <p:cSld>
+    <p:spTree>
+      <p:nvGrpSpPr>
+        <p:cNvPr id="1" name=""/>
+        <p:cNvGrpSpPr/>
+        <p:nvPr/>
+      </p:nvGrpSpPr>
+      <p:grpSpPr>
+        <a:xfrm>
+          <a:off x="0" y="0"/>
+          <a:ext cx="0" cy="0"/>
+          <a:chOff x="0" y="0"/>
+          <a:chExt cx="0" cy="0"/>
+        </a:xfrm>
+      </p:grpSpPr>
+      <p:sp>
+        <p:nvSpPr>
+          <p:cNvPr id="2" name="标题 1">
+            <a:extLst>
+              <a:ext uri="{FF2B5EF4-FFF2-40B4-BE49-F238E27FC236}">
+                <a16:creationId xmlns:a16="http://schemas.microsoft.com/office/drawing/2014/main" id="{171BCD31-4A83-0445-A16D-F52895684121}"/>
+              </a:ext>
+            </a:extLst>
+          </p:cNvPr>
+          <p:cNvSpPr>
+            <a:spLocks noGrp="1"/>
+          </p:cNvSpPr>
+          <p:nvPr>
+            <p:ph type="title"/>
+          </p:nvPr>
+        </p:nvSpPr>
+        <p:spPr/>
+        <p:txBody>
+          <a:bodyPr/>
+          <a:lstStyle/>
+          <a:p>
+            <a:r>
+              <a:rPr lang="en-US" altLang="zh-CN" dirty="0"/>
+              <a:t>Principle</a:t>
+            </a:r>
+            <a:endParaRPr kumimoji="1" lang="zh-CN" altLang="en-US" dirty="0"/>
+          </a:p>
+        </p:txBody>
+      </p:sp>
+      <p:sp>
+        <p:nvSpPr>
+          <p:cNvPr id="3" name="内容占位符 2">
+            <a:extLst>
+              <a:ext uri="{FF2B5EF4-FFF2-40B4-BE49-F238E27FC236}">
+                <a16:creationId xmlns:a16="http://schemas.microsoft.com/office/drawing/2014/main" id="{6FDFF631-2E5C-4548-A4CA-5842368BDB02}"/>
+              </a:ext>
+            </a:extLst>
+          </p:cNvPr>
+          <p:cNvSpPr>
+            <a:spLocks noGrp="1"/>
+          </p:cNvSpPr>
+          <p:nvPr>
+            <p:ph sz="half" idx="1"/>
+          </p:nvPr>
+        </p:nvSpPr>
+        <p:spPr/>
+        <p:txBody>
+          <a:bodyPr/>
+          <a:lstStyle/>
+          <a:p>
+            <a:pPr marL="0" indent="0">
+              <a:lnSpc>
+                <a:spcPct val="150000"/>
+              </a:lnSpc>
+              <a:buNone/>
+            </a:pPr>
+            <a:r>
+              <a:rPr lang="zh-CN" altLang="en-US" dirty="0"/>
+              <a:t>编译器开发者将公共子表达式消除分成两种：</a:t>
+            </a:r>
+          </a:p>
+          <a:p>
+            <a:pPr>
+              <a:lnSpc>
+                <a:spcPct val="150000"/>
+              </a:lnSpc>
+            </a:pPr>
+            <a:r>
+              <a:rPr lang="zh-CN" altLang="en-US" b="1" dirty="0"/>
+              <a:t>本地公共子表达式消除</a:t>
+            </a:r>
+            <a:r>
+              <a:rPr lang="zh-CN" altLang="en-US" dirty="0"/>
+              <a:t>：这项优化技术工作于基本块之内。</a:t>
+            </a:r>
+          </a:p>
+          <a:p>
+            <a:pPr>
+              <a:lnSpc>
+                <a:spcPct val="150000"/>
+              </a:lnSpc>
+            </a:pPr>
+            <a:r>
+              <a:rPr lang="zh-CN" altLang="en-US" b="1" dirty="0"/>
+              <a:t>全局公共子表达式消除</a:t>
+            </a:r>
+            <a:r>
+              <a:rPr lang="zh-CN" altLang="en-US" dirty="0"/>
+              <a:t>：这项优化技术工作于整个过程之中。</a:t>
+            </a:r>
+          </a:p>
+        </p:txBody>
+      </p:sp>
+    </p:spTree>
+    <p:extLst>
+      <p:ext uri="{BB962C8B-B14F-4D97-AF65-F5344CB8AC3E}">
+        <p14:creationId xmlns:p14="http://schemas.microsoft.com/office/powerpoint/2010/main" val="1098238565"/>
+      </p:ext>
+    </p:extLst>
+  </p:cSld>
+  <p:clrMapOvr>
+    <a:masterClrMapping/>
+  </p:clrMapOvr>
+  <mc:AlternateContent xmlns:mc="http://schemas.openxmlformats.org/markup-compatibility/2006" xmlns:p159="http://schemas.microsoft.com/office/powerpoint/2015/09/main">
+    <mc:Choice Requires="p159">
+      <p:transition xmlns:p14="http://schemas.microsoft.com/office/powerpoint/2010/main" spd="slow" p14:dur="2000" advClick="0">
+        <p159:morph option="byObject"/>
+      </p:transition>
+    </mc:Choice>
+    <mc:Fallback xmlns="">
+      <p:transition spd="slow" advClick="0">
+        <p:fade/>
+      </p:transition>
+    </mc:Fallback>
+  </mc:AlternateContent>
+</p:sld>
+</file>
+
+<file path=ppt/slides/slide11.xml><?xml version="1.0" encoding="utf-8"?>
+<p:sld xmlns:a="http://schemas.openxmlformats.org/drawingml/2006/main" xmlns:r="http://schemas.openxmlformats.org/officeDocument/2006/relationships" xmlns:p="http://schemas.openxmlformats.org/presentationml/2006/main">
+  <p:cSld>
+    <p:spTree>
+      <p:nvGrpSpPr>
+        <p:cNvPr id="1" name=""/>
+        <p:cNvGrpSpPr/>
+        <p:nvPr/>
+      </p:nvGrpSpPr>
+      <p:grpSpPr>
+        <a:xfrm>
+          <a:off x="0" y="0"/>
+          <a:ext cx="0" cy="0"/>
+          <a:chOff x="0" y="0"/>
+          <a:chExt cx="0" cy="0"/>
+        </a:xfrm>
+      </p:grpSpPr>
+      <p:sp>
+        <p:nvSpPr>
+          <p:cNvPr id="2" name="标题 1">
+            <a:extLst>
+              <a:ext uri="{FF2B5EF4-FFF2-40B4-BE49-F238E27FC236}">
+                <a16:creationId xmlns:a16="http://schemas.microsoft.com/office/drawing/2014/main" id="{C9A60E64-DBC1-3F47-AC2D-58677586B2D9}"/>
+              </a:ext>
+            </a:extLst>
+          </p:cNvPr>
+          <p:cNvSpPr>
+            <a:spLocks noGrp="1"/>
+          </p:cNvSpPr>
+          <p:nvPr>
+            <p:ph type="title"/>
+          </p:nvPr>
+        </p:nvSpPr>
+        <p:spPr/>
+        <p:txBody>
+          <a:bodyPr/>
+          <a:lstStyle/>
+          <a:p>
+            <a:r>
+              <a:rPr kumimoji="1" lang="en-US" altLang="zh-CN" dirty="0"/>
+              <a:t>Algorithm</a:t>
+            </a:r>
+            <a:endParaRPr kumimoji="1" lang="zh-CN" altLang="en-US" dirty="0"/>
+          </a:p>
+        </p:txBody>
+      </p:sp>
+      <mc:AlternateContent xmlns:mc="http://schemas.openxmlformats.org/markup-compatibility/2006" xmlns:a14="http://schemas.microsoft.com/office/drawing/2010/main">
+        <mc:Choice Requires="a14">
+          <p:sp>
+            <p:nvSpPr>
+              <p:cNvPr id="3" name="内容占位符 2">
+                <a:extLst>
+                  <a:ext uri="{FF2B5EF4-FFF2-40B4-BE49-F238E27FC236}">
+                    <a16:creationId xmlns:a16="http://schemas.microsoft.com/office/drawing/2014/main" id="{B4DE5972-A1F9-B54D-8AFA-FE35BB1ACB56}"/>
+                  </a:ext>
+                </a:extLst>
+              </p:cNvPr>
+              <p:cNvSpPr>
+                <a:spLocks noGrp="1"/>
+              </p:cNvSpPr>
+              <p:nvPr>
+                <p:ph sz="half" idx="1"/>
+              </p:nvPr>
+            </p:nvSpPr>
+            <p:spPr/>
+            <p:txBody>
+              <a:bodyPr/>
+              <a:lstStyle/>
+              <a:p>
+                <a:pPr marL="0" indent="0">
+                  <a:lnSpc>
+                    <a:spcPct val="150000"/>
+                  </a:lnSpc>
+                  <a:buNone/>
+                </a:pPr>
+                <a:r>
+                  <a:rPr kumimoji="1" lang="zh-CN" altLang="en-US" dirty="0">
+                    <a:solidFill>
+                      <a:srgbClr val="374154"/>
+                    </a:solidFill>
+                    <a:latin typeface="Gill Sans MT" panose="020B0502020104020203" pitchFamily="34" charset="0"/>
+                  </a:rPr>
+                  <a:t>对于语句 </a:t>
+                </a:r>
+                <a14:m>
+                  <m:oMath xmlns:m="http://schemas.openxmlformats.org/officeDocument/2006/math">
+                    <m:r>
+                      <a:rPr kumimoji="1" lang="en-US" altLang="zh-CN" b="0" i="0" dirty="0" smtClean="0">
+                        <a:solidFill>
+                          <a:srgbClr val="374154"/>
+                        </a:solidFill>
+                        <a:latin typeface="Cambria Math" panose="02040503050406030204" pitchFamily="18" charset="0"/>
+                      </a:rPr>
+                      <m:t>%</m:t>
+                    </m:r>
+                    <m:r>
+                      <a:rPr kumimoji="1" lang="en-US" altLang="zh-CN" i="1" dirty="0" smtClean="0">
+                        <a:solidFill>
+                          <a:srgbClr val="374154"/>
+                        </a:solidFill>
+                        <a:latin typeface="Cambria Math" panose="02040503050406030204" pitchFamily="18" charset="0"/>
+                      </a:rPr>
+                      <m:t>𝑠</m:t>
+                    </m:r>
+                  </m:oMath>
+                </a14:m>
+                <a:r>
+                  <a:rPr kumimoji="1" lang="zh-CN" altLang="en-US" dirty="0">
+                    <a:solidFill>
+                      <a:srgbClr val="374154"/>
+                    </a:solidFill>
+                    <a:latin typeface="Gill Sans MT" panose="020B0502020104020203" pitchFamily="34" charset="0"/>
+                  </a:rPr>
+                  <a:t>： </a:t>
+                </a:r>
+                <a14:m>
+                  <m:oMath xmlns:m="http://schemas.openxmlformats.org/officeDocument/2006/math">
+                    <m:r>
+                      <a:rPr kumimoji="1" lang="en-US" altLang="zh-CN" i="1" dirty="0" smtClean="0">
+                        <a:solidFill>
+                          <a:srgbClr val="374154"/>
+                        </a:solidFill>
+                        <a:latin typeface="Cambria Math" panose="02040503050406030204" pitchFamily="18" charset="0"/>
+                      </a:rPr>
+                      <m:t>𝑧</m:t>
+                    </m:r>
+                    <m:r>
+                      <a:rPr kumimoji="1" lang="zh-CN" altLang="en-US" i="1" dirty="0" smtClean="0">
+                        <a:solidFill>
+                          <a:srgbClr val="374154"/>
+                        </a:solidFill>
+                        <a:latin typeface="Cambria Math" panose="02040503050406030204" pitchFamily="18" charset="0"/>
+                      </a:rPr>
+                      <m:t> </m:t>
+                    </m:r>
+                    <m:r>
+                      <a:rPr kumimoji="1" lang="en-US" altLang="zh-CN" i="1" dirty="0" smtClean="0">
+                        <a:solidFill>
+                          <a:srgbClr val="374154"/>
+                        </a:solidFill>
+                        <a:latin typeface="Cambria Math" panose="02040503050406030204" pitchFamily="18" charset="0"/>
+                      </a:rPr>
+                      <m:t>=</m:t>
+                    </m:r>
+                    <m:r>
+                      <a:rPr kumimoji="1" lang="zh-CN" altLang="en-US" i="1" dirty="0" smtClean="0">
+                        <a:solidFill>
+                          <a:srgbClr val="374154"/>
+                        </a:solidFill>
+                        <a:latin typeface="Cambria Math" panose="02040503050406030204" pitchFamily="18" charset="0"/>
+                      </a:rPr>
+                      <m:t> </m:t>
+                    </m:r>
+                    <m:r>
+                      <a:rPr kumimoji="1" lang="en-US" altLang="zh-CN" i="1" dirty="0" smtClean="0">
+                        <a:solidFill>
+                          <a:srgbClr val="374154"/>
+                        </a:solidFill>
+                        <a:latin typeface="Cambria Math" panose="02040503050406030204" pitchFamily="18" charset="0"/>
+                      </a:rPr>
+                      <m:t>𝑥</m:t>
+                    </m:r>
+                    <m:r>
+                      <a:rPr kumimoji="1" lang="zh-CN" altLang="en-US" i="1" dirty="0" smtClean="0">
+                        <a:solidFill>
+                          <a:srgbClr val="374154"/>
+                        </a:solidFill>
+                        <a:latin typeface="Cambria Math" panose="02040503050406030204" pitchFamily="18" charset="0"/>
+                      </a:rPr>
+                      <m:t> </m:t>
+                    </m:r>
+                    <m:r>
+                      <a:rPr kumimoji="1" lang="en-US" altLang="zh-CN" i="1" dirty="0" smtClean="0">
+                        <a:solidFill>
+                          <a:srgbClr val="374154"/>
+                        </a:solidFill>
+                        <a:latin typeface="Cambria Math" panose="02040503050406030204" pitchFamily="18" charset="0"/>
+                      </a:rPr>
+                      <m:t>𝑜𝑝</m:t>
+                    </m:r>
+                    <m:r>
+                      <a:rPr kumimoji="1" lang="zh-CN" altLang="en-US" i="1" dirty="0" smtClean="0">
+                        <a:solidFill>
+                          <a:srgbClr val="374154"/>
+                        </a:solidFill>
+                        <a:latin typeface="Cambria Math" panose="02040503050406030204" pitchFamily="18" charset="0"/>
+                      </a:rPr>
+                      <m:t> </m:t>
+                    </m:r>
+                    <m:r>
+                      <a:rPr kumimoji="1" lang="en-US" altLang="zh-CN" i="1" dirty="0" smtClean="0">
+                        <a:solidFill>
+                          <a:srgbClr val="374154"/>
+                        </a:solidFill>
+                        <a:latin typeface="Cambria Math" panose="02040503050406030204" pitchFamily="18" charset="0"/>
+                      </a:rPr>
+                      <m:t>𝑦</m:t>
+                    </m:r>
+                  </m:oMath>
+                </a14:m>
+                <a:r>
+                  <a:rPr kumimoji="1" lang="zh-CN" altLang="en-US" dirty="0">
+                    <a:solidFill>
+                      <a:srgbClr val="374154"/>
+                    </a:solidFill>
+                    <a:latin typeface="Gill Sans MT" panose="020B0502020104020203" pitchFamily="34" charset="0"/>
+                  </a:rPr>
+                  <a:t>，若 </a:t>
+                </a:r>
+                <a14:m>
+                  <m:oMath xmlns:m="http://schemas.openxmlformats.org/officeDocument/2006/math">
+                    <m:r>
+                      <a:rPr kumimoji="1" lang="en-US" altLang="zh-CN" i="1" dirty="0" smtClean="0">
+                        <a:solidFill>
+                          <a:srgbClr val="374154"/>
+                        </a:solidFill>
+                        <a:latin typeface="Cambria Math" panose="02040503050406030204" pitchFamily="18" charset="0"/>
+                      </a:rPr>
+                      <m:t>𝑥</m:t>
+                    </m:r>
+                    <m:r>
+                      <a:rPr kumimoji="1" lang="zh-CN" altLang="en-US" i="1" dirty="0" smtClean="0">
+                        <a:solidFill>
+                          <a:srgbClr val="374154"/>
+                        </a:solidFill>
+                        <a:latin typeface="Cambria Math" panose="02040503050406030204" pitchFamily="18" charset="0"/>
+                      </a:rPr>
+                      <m:t> </m:t>
+                    </m:r>
+                    <m:r>
+                      <a:rPr kumimoji="1" lang="en-US" altLang="zh-CN" i="1" dirty="0" smtClean="0">
+                        <a:solidFill>
+                          <a:srgbClr val="374154"/>
+                        </a:solidFill>
+                        <a:latin typeface="Cambria Math" panose="02040503050406030204" pitchFamily="18" charset="0"/>
+                      </a:rPr>
+                      <m:t>𝑜𝑝</m:t>
+                    </m:r>
+                    <m:r>
+                      <a:rPr kumimoji="1" lang="zh-CN" altLang="en-US" i="1" dirty="0" smtClean="0">
+                        <a:solidFill>
+                          <a:srgbClr val="374154"/>
+                        </a:solidFill>
+                        <a:latin typeface="Cambria Math" panose="02040503050406030204" pitchFamily="18" charset="0"/>
+                      </a:rPr>
+                      <m:t> </m:t>
+                    </m:r>
+                    <m:r>
+                      <a:rPr kumimoji="1" lang="en-US" altLang="zh-CN" i="1" dirty="0" smtClean="0">
+                        <a:solidFill>
+                          <a:srgbClr val="374154"/>
+                        </a:solidFill>
+                        <a:latin typeface="Cambria Math" panose="02040503050406030204" pitchFamily="18" charset="0"/>
+                      </a:rPr>
+                      <m:t>𝑦</m:t>
+                    </m:r>
+                  </m:oMath>
+                </a14:m>
+                <a:r>
+                  <a:rPr kumimoji="1" lang="zh-CN" altLang="en-US" dirty="0">
+                    <a:solidFill>
+                      <a:srgbClr val="374154"/>
+                    </a:solidFill>
+                    <a:latin typeface="Gill Sans MT" panose="020B0502020104020203" pitchFamily="34" charset="0"/>
+                  </a:rPr>
+                  <a:t> 在语句 </a:t>
+                </a:r>
+                <a14:m>
+                  <m:oMath xmlns:m="http://schemas.openxmlformats.org/officeDocument/2006/math">
+                    <m:r>
+                      <a:rPr kumimoji="1" lang="en-US" altLang="zh-CN" i="1" dirty="0" smtClean="0">
+                        <a:solidFill>
+                          <a:srgbClr val="374154"/>
+                        </a:solidFill>
+                        <a:latin typeface="Cambria Math" panose="02040503050406030204" pitchFamily="18" charset="0"/>
+                      </a:rPr>
+                      <m:t>𝑠</m:t>
+                    </m:r>
+                  </m:oMath>
+                </a14:m>
+                <a:r>
+                  <a:rPr kumimoji="1" lang="zh-CN" altLang="en-US" dirty="0">
+                    <a:solidFill>
+                      <a:srgbClr val="374154"/>
+                    </a:solidFill>
+                    <a:latin typeface="Gill Sans MT" panose="020B0502020104020203" pitchFamily="34" charset="0"/>
+                  </a:rPr>
+                  <a:t> 之前可用，则：</a:t>
+                </a:r>
+                <a:endParaRPr kumimoji="1" lang="en-US" altLang="zh-CN" dirty="0">
+                  <a:solidFill>
+                    <a:srgbClr val="374154"/>
+                  </a:solidFill>
+                  <a:latin typeface="Gill Sans MT" panose="020B0502020104020203" pitchFamily="34" charset="0"/>
+                </a:endParaRPr>
+              </a:p>
+              <a:p>
+                <a:pPr>
+                  <a:lnSpc>
+                    <a:spcPct val="150000"/>
+                  </a:lnSpc>
+                </a:pPr>
+                <a:endParaRPr kumimoji="1" lang="en-US" altLang="zh-CN" dirty="0">
+                  <a:solidFill>
+                    <a:srgbClr val="374154"/>
+                  </a:solidFill>
+                  <a:latin typeface="Gill Sans MT" panose="020B0502020104020203" pitchFamily="34" charset="0"/>
+                </a:endParaRPr>
+              </a:p>
+              <a:p>
+                <a:pPr marL="457200" indent="-457200">
+                  <a:lnSpc>
+                    <a:spcPct val="150000"/>
+                  </a:lnSpc>
+                  <a:buFont typeface="+mj-lt"/>
+                  <a:buAutoNum type="arabicPeriod"/>
+                </a:pPr>
+                <a:r>
+                  <a:rPr kumimoji="1" lang="zh-CN" altLang="en-US" dirty="0">
+                    <a:solidFill>
+                      <a:srgbClr val="374154"/>
+                    </a:solidFill>
+                    <a:latin typeface="Gill Sans MT" panose="020B0502020104020203" pitchFamily="34" charset="0"/>
+                  </a:rPr>
+                  <a:t>从 </a:t>
+                </a:r>
+                <a14:m>
+                  <m:oMath xmlns:m="http://schemas.openxmlformats.org/officeDocument/2006/math">
+                    <m:r>
+                      <a:rPr kumimoji="1" lang="en-US" altLang="zh-CN" i="1" dirty="0" smtClean="0">
+                        <a:solidFill>
+                          <a:srgbClr val="374154"/>
+                        </a:solidFill>
+                        <a:latin typeface="Cambria Math" panose="02040503050406030204" pitchFamily="18" charset="0"/>
+                      </a:rPr>
+                      <m:t>𝑠</m:t>
+                    </m:r>
+                  </m:oMath>
+                </a14:m>
+                <a:r>
+                  <a:rPr kumimoji="1" lang="zh-CN" altLang="en-US" dirty="0">
+                    <a:solidFill>
+                      <a:srgbClr val="374154"/>
+                    </a:solidFill>
+                    <a:latin typeface="Gill Sans MT" panose="020B0502020104020203" pitchFamily="34" charset="0"/>
+                  </a:rPr>
+                  <a:t> 开始逆向搜索 </a:t>
+                </a:r>
+                <a:r>
+                  <a:rPr kumimoji="1" lang="en-US" altLang="zh-CN" dirty="0">
+                    <a:solidFill>
+                      <a:srgbClr val="374154"/>
+                    </a:solidFill>
+                    <a:latin typeface="Gill Sans MT" panose="020B0502020104020203" pitchFamily="34" charset="0"/>
+                  </a:rPr>
+                  <a:t>IR</a:t>
+                </a:r>
+                <a:r>
+                  <a:rPr kumimoji="1" lang="zh-CN" altLang="en-US" dirty="0">
+                    <a:solidFill>
+                      <a:srgbClr val="374154"/>
+                    </a:solidFill>
+                    <a:latin typeface="Gill Sans MT" panose="020B0502020104020203" pitchFamily="34" charset="0"/>
+                  </a:rPr>
+                  <a:t>，找到距离 </a:t>
+                </a:r>
+                <a14:m>
+                  <m:oMath xmlns:m="http://schemas.openxmlformats.org/officeDocument/2006/math">
+                    <m:r>
+                      <a:rPr kumimoji="1" lang="en-US" altLang="zh-CN" i="1" dirty="0" smtClean="0">
+                        <a:solidFill>
+                          <a:srgbClr val="374154"/>
+                        </a:solidFill>
+                        <a:latin typeface="Cambria Math" panose="02040503050406030204" pitchFamily="18" charset="0"/>
+                      </a:rPr>
+                      <m:t>𝑠</m:t>
+                    </m:r>
+                  </m:oMath>
+                </a14:m>
+                <a:r>
+                  <a:rPr kumimoji="1" lang="zh-CN" altLang="en-US" dirty="0">
+                    <a:solidFill>
+                      <a:srgbClr val="374154"/>
+                    </a:solidFill>
+                    <a:latin typeface="Gill Sans MT" panose="020B0502020104020203" pitchFamily="34" charset="0"/>
+                  </a:rPr>
+                  <a:t> 最近执行 </a:t>
+                </a:r>
+                <a14:m>
+                  <m:oMath xmlns:m="http://schemas.openxmlformats.org/officeDocument/2006/math">
+                    <m:r>
+                      <m:rPr>
+                        <m:sty m:val="p"/>
+                      </m:rPr>
+                      <a:rPr kumimoji="1" lang="en-US" altLang="zh-CN" b="0" i="0" dirty="0" smtClean="0">
+                        <a:solidFill>
+                          <a:srgbClr val="374154"/>
+                        </a:solidFill>
+                        <a:latin typeface="Cambria Math" panose="02040503050406030204" pitchFamily="18" charset="0"/>
+                      </a:rPr>
+                      <m:t>w</m:t>
+                    </m:r>
+                    <m:r>
+                      <a:rPr kumimoji="1" lang="en-US" altLang="zh-CN" b="0" i="0" dirty="0" smtClean="0">
+                        <a:solidFill>
+                          <a:srgbClr val="374154"/>
+                        </a:solidFill>
+                        <a:latin typeface="Cambria Math" panose="02040503050406030204" pitchFamily="18" charset="0"/>
+                      </a:rPr>
+                      <m:t>=</m:t>
+                    </m:r>
+                    <m:r>
+                      <a:rPr kumimoji="1" lang="en-US" altLang="zh-CN" i="1" dirty="0" smtClean="0">
+                        <a:solidFill>
+                          <a:srgbClr val="374154"/>
+                        </a:solidFill>
+                        <a:latin typeface="Cambria Math" panose="02040503050406030204" pitchFamily="18" charset="0"/>
+                      </a:rPr>
+                      <m:t>𝑥</m:t>
+                    </m:r>
+                    <m:r>
+                      <a:rPr kumimoji="1" lang="zh-CN" altLang="en-US" i="1" dirty="0" smtClean="0">
+                        <a:solidFill>
+                          <a:srgbClr val="374154"/>
+                        </a:solidFill>
+                        <a:latin typeface="Cambria Math" panose="02040503050406030204" pitchFamily="18" charset="0"/>
+                      </a:rPr>
+                      <m:t> </m:t>
+                    </m:r>
+                    <m:r>
+                      <a:rPr kumimoji="1" lang="en-US" altLang="zh-CN" i="1" dirty="0" smtClean="0">
+                        <a:solidFill>
+                          <a:srgbClr val="374154"/>
+                        </a:solidFill>
+                        <a:latin typeface="Cambria Math" panose="02040503050406030204" pitchFamily="18" charset="0"/>
+                      </a:rPr>
+                      <m:t>𝑜𝑝</m:t>
+                    </m:r>
+                    <m:r>
+                      <a:rPr kumimoji="1" lang="zh-CN" altLang="en-US" i="1" dirty="0" smtClean="0">
+                        <a:solidFill>
+                          <a:srgbClr val="374154"/>
+                        </a:solidFill>
+                        <a:latin typeface="Cambria Math" panose="02040503050406030204" pitchFamily="18" charset="0"/>
+                      </a:rPr>
+                      <m:t> </m:t>
+                    </m:r>
+                    <m:r>
+                      <a:rPr kumimoji="1" lang="en-US" altLang="zh-CN" i="1" dirty="0" smtClean="0">
+                        <a:solidFill>
+                          <a:srgbClr val="374154"/>
+                        </a:solidFill>
+                        <a:latin typeface="Cambria Math" panose="02040503050406030204" pitchFamily="18" charset="0"/>
+                      </a:rPr>
+                      <m:t>𝑦</m:t>
+                    </m:r>
+                  </m:oMath>
+                </a14:m>
+                <a:r>
+                  <a:rPr kumimoji="1" lang="zh-CN" altLang="en-US" dirty="0">
+                    <a:solidFill>
+                      <a:srgbClr val="374154"/>
+                    </a:solidFill>
+                    <a:latin typeface="Gill Sans MT" panose="020B0502020104020203" pitchFamily="34" charset="0"/>
+                  </a:rPr>
+                  <a:t> 的语句</a:t>
+                </a:r>
+                <a:endParaRPr kumimoji="1" lang="en-US" altLang="zh-CN" dirty="0">
+                  <a:solidFill>
+                    <a:srgbClr val="374154"/>
+                  </a:solidFill>
+                  <a:latin typeface="Gill Sans MT" panose="020B0502020104020203" pitchFamily="34" charset="0"/>
+                </a:endParaRPr>
+              </a:p>
+              <a:p>
+                <a:pPr marL="457200" indent="-457200">
+                  <a:lnSpc>
+                    <a:spcPct val="150000"/>
+                  </a:lnSpc>
+                  <a:buFont typeface="+mj-lt"/>
+                  <a:buAutoNum type="arabicPeriod"/>
+                </a:pPr>
+                <a:r>
+                  <a:rPr kumimoji="1" lang="zh-CN" altLang="en-US" dirty="0">
+                    <a:solidFill>
+                      <a:srgbClr val="374154"/>
+                    </a:solidFill>
+                    <a:latin typeface="Gill Sans MT" panose="020B0502020104020203" pitchFamily="34" charset="0"/>
+                  </a:rPr>
+                  <a:t>建立临时变量 </a:t>
+                </a:r>
+                <a14:m>
+                  <m:oMath xmlns:m="http://schemas.openxmlformats.org/officeDocument/2006/math">
+                    <m:r>
+                      <a:rPr kumimoji="1" lang="en-US" altLang="zh-CN" i="1" dirty="0" smtClean="0">
+                        <a:solidFill>
+                          <a:srgbClr val="374154"/>
+                        </a:solidFill>
+                        <a:latin typeface="Cambria Math" panose="02040503050406030204" pitchFamily="18" charset="0"/>
+                      </a:rPr>
+                      <m:t>%</m:t>
+                    </m:r>
+                    <m:r>
+                      <a:rPr kumimoji="1" lang="en-US" altLang="zh-CN" i="1" dirty="0" smtClean="0">
+                        <a:solidFill>
+                          <a:srgbClr val="374154"/>
+                        </a:solidFill>
+                        <a:latin typeface="Cambria Math" panose="02040503050406030204" pitchFamily="18" charset="0"/>
+                      </a:rPr>
+                      <m:t>𝑢</m:t>
+                    </m:r>
+                  </m:oMath>
+                </a14:m>
+                <a:endParaRPr kumimoji="1" lang="en-US" altLang="zh-CN" dirty="0">
+                  <a:solidFill>
+                    <a:srgbClr val="374154"/>
+                  </a:solidFill>
+                  <a:latin typeface="Gill Sans MT" panose="020B0502020104020203" pitchFamily="34" charset="0"/>
+                </a:endParaRPr>
+              </a:p>
+              <a:p>
+                <a:pPr marL="457200" indent="-457200">
+                  <a:lnSpc>
+                    <a:spcPct val="150000"/>
+                  </a:lnSpc>
+                  <a:buFont typeface="+mj-lt"/>
+                  <a:buAutoNum type="arabicPeriod"/>
+                </a:pPr>
+                <a:r>
+                  <a:rPr kumimoji="1" lang="zh-CN" altLang="en-US" dirty="0">
+                    <a:solidFill>
+                      <a:srgbClr val="374154"/>
+                    </a:solidFill>
+                    <a:latin typeface="Gill Sans MT" panose="020B0502020104020203" pitchFamily="34" charset="0"/>
+                  </a:rPr>
+                  <a:t>把步骤 </a:t>
+                </a:r>
+                <a:r>
+                  <a:rPr kumimoji="1" lang="en-US" altLang="zh-CN" dirty="0">
+                    <a:solidFill>
+                      <a:srgbClr val="374154"/>
+                    </a:solidFill>
+                    <a:latin typeface="Gill Sans MT" panose="020B0502020104020203" pitchFamily="34" charset="0"/>
+                  </a:rPr>
+                  <a:t>1</a:t>
+                </a:r>
+                <a:r>
+                  <a:rPr kumimoji="1" lang="zh-CN" altLang="en-US" dirty="0">
+                    <a:solidFill>
+                      <a:srgbClr val="374154"/>
+                    </a:solidFill>
+                    <a:latin typeface="Gill Sans MT" panose="020B0502020104020203" pitchFamily="34" charset="0"/>
+                  </a:rPr>
+                  <a:t> 中找到的语句 </a:t>
+                </a:r>
+                <a14:m>
+                  <m:oMath xmlns:m="http://schemas.openxmlformats.org/officeDocument/2006/math">
+                    <m:r>
+                      <m:rPr>
+                        <m:sty m:val="p"/>
+                      </m:rPr>
+                      <a:rPr kumimoji="1" lang="en-US" altLang="zh-CN" dirty="0">
+                        <a:solidFill>
+                          <a:srgbClr val="374154"/>
+                        </a:solidFill>
+                        <a:latin typeface="Cambria Math" panose="02040503050406030204" pitchFamily="18" charset="0"/>
+                      </a:rPr>
+                      <m:t>w</m:t>
+                    </m:r>
+                    <m:r>
+                      <a:rPr kumimoji="1" lang="en-US" altLang="zh-CN" dirty="0">
+                        <a:solidFill>
+                          <a:srgbClr val="374154"/>
+                        </a:solidFill>
+                        <a:latin typeface="Cambria Math" panose="02040503050406030204" pitchFamily="18" charset="0"/>
+                      </a:rPr>
+                      <m:t>=</m:t>
+                    </m:r>
+                    <m:r>
+                      <a:rPr kumimoji="1" lang="en-US" altLang="zh-CN" i="1" dirty="0">
+                        <a:solidFill>
+                          <a:srgbClr val="374154"/>
+                        </a:solidFill>
+                        <a:latin typeface="Cambria Math" panose="02040503050406030204" pitchFamily="18" charset="0"/>
+                      </a:rPr>
+                      <m:t>𝑥</m:t>
+                    </m:r>
+                    <m:r>
+                      <a:rPr kumimoji="1" lang="zh-CN" altLang="en-US" i="1" dirty="0">
+                        <a:solidFill>
+                          <a:srgbClr val="374154"/>
+                        </a:solidFill>
+                        <a:latin typeface="Cambria Math" panose="02040503050406030204" pitchFamily="18" charset="0"/>
+                      </a:rPr>
+                      <m:t> </m:t>
+                    </m:r>
+                    <m:r>
+                      <a:rPr kumimoji="1" lang="en-US" altLang="zh-CN" i="1" dirty="0">
+                        <a:solidFill>
+                          <a:srgbClr val="374154"/>
+                        </a:solidFill>
+                        <a:latin typeface="Cambria Math" panose="02040503050406030204" pitchFamily="18" charset="0"/>
+                      </a:rPr>
+                      <m:t>𝑜𝑝</m:t>
+                    </m:r>
+                    <m:r>
+                      <a:rPr kumimoji="1" lang="zh-CN" altLang="en-US" i="1" dirty="0">
+                        <a:solidFill>
+                          <a:srgbClr val="374154"/>
+                        </a:solidFill>
+                        <a:latin typeface="Cambria Math" panose="02040503050406030204" pitchFamily="18" charset="0"/>
+                      </a:rPr>
+                      <m:t> </m:t>
+                    </m:r>
+                    <m:r>
+                      <a:rPr kumimoji="1" lang="en-US" altLang="zh-CN" i="1" dirty="0">
+                        <a:solidFill>
+                          <a:srgbClr val="374154"/>
+                        </a:solidFill>
+                        <a:latin typeface="Cambria Math" panose="02040503050406030204" pitchFamily="18" charset="0"/>
+                      </a:rPr>
+                      <m:t>𝑦</m:t>
+                    </m:r>
+                  </m:oMath>
+                </a14:m>
+                <a:r>
+                  <a:rPr kumimoji="1" lang="zh-CN" altLang="en-US" dirty="0">
+                    <a:solidFill>
+                      <a:srgbClr val="374154"/>
+                    </a:solidFill>
+                    <a:latin typeface="Gill Sans MT" panose="020B0502020104020203" pitchFamily="34" charset="0"/>
+                  </a:rPr>
+                  <a:t> 进行替换：</a:t>
+                </a:r>
+                <a:endParaRPr kumimoji="1" lang="en-US" altLang="zh-CN" dirty="0">
+                  <a:solidFill>
+                    <a:srgbClr val="374154"/>
+                  </a:solidFill>
+                  <a:latin typeface="Gill Sans MT" panose="020B0502020104020203" pitchFamily="34" charset="0"/>
+                </a:endParaRPr>
+              </a:p>
+              <a:p>
+                <a:pPr marL="0" indent="0" algn="ctr">
+                  <a:lnSpc>
+                    <a:spcPct val="150000"/>
+                  </a:lnSpc>
+                  <a:buNone/>
+                </a:pPr>
+                <a14:m>
+                  <m:oMathPara xmlns:m="http://schemas.openxmlformats.org/officeDocument/2006/math">
+                    <m:oMathParaPr>
+                      <m:jc m:val="centerGroup"/>
+                    </m:oMathParaPr>
+                    <m:oMath xmlns:m="http://schemas.openxmlformats.org/officeDocument/2006/math">
+                      <m:r>
+                        <a:rPr kumimoji="1" lang="en-US" altLang="zh-CN" i="1" dirty="0" smtClean="0">
+                          <a:solidFill>
+                            <a:srgbClr val="374154"/>
+                          </a:solidFill>
+                          <a:latin typeface="Cambria Math" panose="02040503050406030204" pitchFamily="18" charset="0"/>
+                        </a:rPr>
+                        <m:t>%</m:t>
+                      </m:r>
+                      <m:r>
+                        <a:rPr kumimoji="1" lang="en-US" altLang="zh-CN" i="1" dirty="0" smtClean="0">
+                          <a:solidFill>
+                            <a:srgbClr val="374154"/>
+                          </a:solidFill>
+                          <a:latin typeface="Cambria Math" panose="02040503050406030204" pitchFamily="18" charset="0"/>
+                        </a:rPr>
+                        <m:t>𝑢</m:t>
+                      </m:r>
+                      <m:r>
+                        <a:rPr kumimoji="1" lang="en-US" altLang="zh-CN" i="1" dirty="0" smtClean="0">
+                          <a:solidFill>
+                            <a:srgbClr val="374154"/>
+                          </a:solidFill>
+                          <a:latin typeface="Cambria Math" panose="02040503050406030204" pitchFamily="18" charset="0"/>
+                        </a:rPr>
+                        <m:t>=</m:t>
+                      </m:r>
+                      <m:r>
+                        <a:rPr kumimoji="1" lang="en-US" altLang="zh-CN" i="1" dirty="0" smtClean="0">
+                          <a:solidFill>
+                            <a:srgbClr val="374154"/>
+                          </a:solidFill>
+                          <a:latin typeface="Cambria Math" panose="02040503050406030204" pitchFamily="18" charset="0"/>
+                        </a:rPr>
+                        <m:t>𝑥</m:t>
+                      </m:r>
+                      <m:r>
+                        <a:rPr kumimoji="1" lang="zh-CN" altLang="en-US" i="1" dirty="0">
+                          <a:solidFill>
+                            <a:srgbClr val="374154"/>
+                          </a:solidFill>
+                          <a:latin typeface="Cambria Math" panose="02040503050406030204" pitchFamily="18" charset="0"/>
+                        </a:rPr>
+                        <m:t> </m:t>
+                      </m:r>
+                      <m:r>
+                        <a:rPr kumimoji="1" lang="en-US" altLang="zh-CN" i="1" dirty="0" smtClean="0">
+                          <a:solidFill>
+                            <a:srgbClr val="374154"/>
+                          </a:solidFill>
+                          <a:latin typeface="Cambria Math" panose="02040503050406030204" pitchFamily="18" charset="0"/>
+                        </a:rPr>
+                        <m:t>𝑜𝑝</m:t>
+                      </m:r>
+                      <m:r>
+                        <a:rPr kumimoji="1" lang="zh-CN" altLang="en-US" i="1" dirty="0">
+                          <a:solidFill>
+                            <a:srgbClr val="374154"/>
+                          </a:solidFill>
+                          <a:latin typeface="Cambria Math" panose="02040503050406030204" pitchFamily="18" charset="0"/>
+                        </a:rPr>
+                        <m:t> </m:t>
+                      </m:r>
+                      <m:r>
+                        <a:rPr kumimoji="1" lang="en-US" altLang="zh-CN" i="1" dirty="0">
+                          <a:solidFill>
+                            <a:srgbClr val="374154"/>
+                          </a:solidFill>
+                          <a:latin typeface="Cambria Math" panose="02040503050406030204" pitchFamily="18" charset="0"/>
+                        </a:rPr>
+                        <m:t>𝑦</m:t>
+                      </m:r>
+                    </m:oMath>
+                  </m:oMathPara>
+                </a14:m>
+                <a:endParaRPr kumimoji="1" lang="en-US" altLang="zh-CN" dirty="0">
+                  <a:solidFill>
+                    <a:srgbClr val="374154"/>
+                  </a:solidFill>
+                  <a:latin typeface="Gill Sans MT" panose="020B0502020104020203" pitchFamily="34" charset="0"/>
+                </a:endParaRPr>
+              </a:p>
+              <a:p>
+                <a:pPr marL="0" indent="0">
+                  <a:lnSpc>
+                    <a:spcPct val="150000"/>
+                  </a:lnSpc>
+                  <a:buNone/>
+                </a:pPr>
+                <a14:m>
+                  <m:oMathPara xmlns:m="http://schemas.openxmlformats.org/officeDocument/2006/math">
+                    <m:oMathParaPr>
+                      <m:jc m:val="centerGroup"/>
+                    </m:oMathParaPr>
+                    <m:oMath xmlns:m="http://schemas.openxmlformats.org/officeDocument/2006/math">
+                      <m:r>
+                        <a:rPr kumimoji="1" lang="en-US" altLang="zh-CN" i="1" dirty="0" smtClean="0">
+                          <a:solidFill>
+                            <a:srgbClr val="374154"/>
+                          </a:solidFill>
+                          <a:latin typeface="Cambria Math" panose="02040503050406030204" pitchFamily="18" charset="0"/>
+                        </a:rPr>
+                        <m:t>%</m:t>
+                      </m:r>
+                      <m:r>
+                        <a:rPr kumimoji="1" lang="en-US" altLang="zh-CN" i="1" dirty="0" smtClean="0">
+                          <a:solidFill>
+                            <a:srgbClr val="374154"/>
+                          </a:solidFill>
+                          <a:latin typeface="Cambria Math" panose="02040503050406030204" pitchFamily="18" charset="0"/>
+                        </a:rPr>
+                        <m:t>𝑤</m:t>
+                      </m:r>
+                      <m:r>
+                        <a:rPr kumimoji="1" lang="en-US" altLang="zh-CN" i="1" dirty="0" smtClean="0">
+                          <a:solidFill>
+                            <a:srgbClr val="374154"/>
+                          </a:solidFill>
+                          <a:latin typeface="Cambria Math" panose="02040503050406030204" pitchFamily="18" charset="0"/>
+                        </a:rPr>
+                        <m:t>=</m:t>
+                      </m:r>
+                      <m:r>
+                        <a:rPr kumimoji="1" lang="en-US" altLang="zh-CN" i="1" dirty="0">
+                          <a:solidFill>
+                            <a:srgbClr val="374154"/>
+                          </a:solidFill>
+                          <a:latin typeface="Cambria Math" panose="02040503050406030204" pitchFamily="18" charset="0"/>
+                        </a:rPr>
+                        <m:t>𝑢</m:t>
+                      </m:r>
+                    </m:oMath>
+                  </m:oMathPara>
+                </a14:m>
+                <a:endParaRPr kumimoji="1" lang="en-US" altLang="zh-CN" dirty="0">
+                  <a:solidFill>
+                    <a:srgbClr val="374154"/>
+                  </a:solidFill>
+                  <a:latin typeface="Gill Sans MT" panose="020B0502020104020203" pitchFamily="34" charset="0"/>
+                </a:endParaRPr>
+              </a:p>
+              <a:p>
+                <a:pPr marL="457200" indent="-457200">
+                  <a:lnSpc>
+                    <a:spcPct val="150000"/>
+                  </a:lnSpc>
+                  <a:buFont typeface="+mj-lt"/>
+                  <a:buAutoNum type="arabicPeriod" startAt="4"/>
+                </a:pPr>
+                <a:r>
+                  <a:rPr kumimoji="1" lang="zh-CN" altLang="en-US" dirty="0">
+                    <a:solidFill>
+                      <a:srgbClr val="374154"/>
+                    </a:solidFill>
+                    <a:latin typeface="Gill Sans MT" panose="020B0502020104020203" pitchFamily="34" charset="0"/>
+                  </a:rPr>
+                  <a:t>使用 </a:t>
+                </a:r>
+                <a14:m>
+                  <m:oMath xmlns:m="http://schemas.openxmlformats.org/officeDocument/2006/math">
+                    <m:r>
+                      <a:rPr kumimoji="1" lang="en-US" altLang="zh-CN" i="1" dirty="0" smtClean="0">
+                        <a:solidFill>
+                          <a:srgbClr val="374154"/>
+                        </a:solidFill>
+                        <a:latin typeface="Cambria Math" panose="02040503050406030204" pitchFamily="18" charset="0"/>
+                      </a:rPr>
+                      <m:t>𝑧</m:t>
+                    </m:r>
+                    <m:r>
+                      <a:rPr kumimoji="1" lang="en-US" altLang="zh-CN" i="1" dirty="0" smtClean="0">
+                        <a:solidFill>
+                          <a:srgbClr val="374154"/>
+                        </a:solidFill>
+                        <a:latin typeface="Cambria Math" panose="02040503050406030204" pitchFamily="18" charset="0"/>
+                      </a:rPr>
+                      <m:t>=</m:t>
+                    </m:r>
+                    <m:r>
+                      <a:rPr kumimoji="1" lang="en-US" altLang="zh-CN" i="1" dirty="0" smtClean="0">
+                        <a:solidFill>
+                          <a:srgbClr val="374154"/>
+                        </a:solidFill>
+                        <a:latin typeface="Cambria Math" panose="02040503050406030204" pitchFamily="18" charset="0"/>
+                      </a:rPr>
+                      <m:t>𝑢</m:t>
+                    </m:r>
+                  </m:oMath>
+                </a14:m>
+                <a:r>
+                  <a:rPr kumimoji="1" lang="zh-CN" altLang="en-US" dirty="0">
+                    <a:solidFill>
+                      <a:srgbClr val="374154"/>
+                    </a:solidFill>
+                    <a:latin typeface="Gill Sans MT" panose="020B0502020104020203" pitchFamily="34" charset="0"/>
+                  </a:rPr>
+                  <a:t> 替换</a:t>
+                </a:r>
+                <a:r>
+                  <a:rPr kumimoji="1" lang="en-US" altLang="zh-CN" dirty="0">
+                    <a:solidFill>
+                      <a:srgbClr val="374154"/>
+                    </a:solidFill>
+                    <a:latin typeface="Gill Sans MT" panose="020B0502020104020203" pitchFamily="34" charset="0"/>
+                  </a:rPr>
+                  <a:t>s</a:t>
+                </a:r>
+                <a:r>
+                  <a:rPr kumimoji="1" lang="zh-CN" altLang="en-US" dirty="0">
+                    <a:solidFill>
+                      <a:srgbClr val="374154"/>
+                    </a:solidFill>
+                    <a:latin typeface="Gill Sans MT" panose="020B0502020104020203" pitchFamily="34" charset="0"/>
+                  </a:rPr>
+                  <a:t>，重复步骤 </a:t>
+                </a:r>
+                <a:r>
+                  <a:rPr kumimoji="1" lang="en-US" altLang="zh-CN" dirty="0">
+                    <a:solidFill>
+                      <a:srgbClr val="374154"/>
+                    </a:solidFill>
+                    <a:latin typeface="Gill Sans MT" panose="020B0502020104020203" pitchFamily="34" charset="0"/>
+                  </a:rPr>
+                  <a:t>1</a:t>
+                </a:r>
+                <a:r>
+                  <a:rPr kumimoji="1" lang="zh-CN" altLang="en-US" dirty="0">
+                    <a:latin typeface="Gill Sans MT" panose="020B0502020104020203" pitchFamily="34" charset="0"/>
+                  </a:rPr>
+                  <a:t> </a:t>
+                </a:r>
+                <a:r>
+                  <a:rPr kumimoji="1" lang="zh-CN" altLang="en-US" dirty="0">
+                    <a:solidFill>
+                      <a:srgbClr val="374154"/>
+                    </a:solidFill>
+                    <a:latin typeface="Gill Sans MT" panose="020B0502020104020203" pitchFamily="34" charset="0"/>
+                  </a:rPr>
+                  <a:t>直到遍历完 </a:t>
+                </a:r>
+                <a:r>
+                  <a:rPr kumimoji="1" lang="en-US" altLang="zh-CN" dirty="0">
+                    <a:solidFill>
+                      <a:srgbClr val="374154"/>
+                    </a:solidFill>
+                    <a:latin typeface="Gill Sans MT" panose="020B0502020104020203" pitchFamily="34" charset="0"/>
+                  </a:rPr>
+                  <a:t>IR</a:t>
+                </a:r>
+              </a:p>
+            </p:txBody>
+          </p:sp>
+        </mc:Choice>
+        <mc:Fallback xmlns="">
+          <p:sp>
+            <p:nvSpPr>
+              <p:cNvPr id="3" name="内容占位符 2">
+                <a:extLst>
+                  <a:ext uri="{FF2B5EF4-FFF2-40B4-BE49-F238E27FC236}">
+                    <a16:creationId xmlns:a16="http://schemas.microsoft.com/office/drawing/2014/main" id="{B4DE5972-A1F9-B54D-8AFA-FE35BB1ACB56}"/>
+                  </a:ext>
+                </a:extLst>
+              </p:cNvPr>
+              <p:cNvSpPr>
+                <a:spLocks noGrp="1" noRot="1" noChangeAspect="1" noMove="1" noResize="1" noEditPoints="1" noAdjustHandles="1" noChangeArrowheads="1" noChangeShapeType="1" noTextEdit="1"/>
+              </p:cNvSpPr>
+              <p:nvPr>
+                <p:ph sz="half" idx="1"/>
+              </p:nvPr>
+            </p:nvSpPr>
+            <p:spPr>
+              <a:blipFill>
+                <a:blip r:embed="rId2"/>
+                <a:stretch>
+                  <a:fillRect l="-463"/>
+                </a:stretch>
+              </a:blipFill>
+            </p:spPr>
+            <p:txBody>
+              <a:bodyPr/>
+              <a:lstStyle/>
+              <a:p>
+                <a:r>
+                  <a:rPr lang="zh-CN" altLang="en-US">
+                    <a:noFill/>
+                  </a:rPr>
+                  <a:t> </a:t>
+                </a:r>
+              </a:p>
+            </p:txBody>
+          </p:sp>
+        </mc:Fallback>
+      </mc:AlternateContent>
+    </p:spTree>
+    <p:extLst>
+      <p:ext uri="{BB962C8B-B14F-4D97-AF65-F5344CB8AC3E}">
+        <p14:creationId xmlns:p14="http://schemas.microsoft.com/office/powerpoint/2010/main" val="2196050557"/>
+      </p:ext>
+    </p:extLst>
+  </p:cSld>
+  <p:clrMapOvr>
+    <a:masterClrMapping/>
+  </p:clrMapOvr>
+  <mc:AlternateContent xmlns:mc="http://schemas.openxmlformats.org/markup-compatibility/2006" xmlns:p159="http://schemas.microsoft.com/office/powerpoint/2015/09/main">
+    <mc:Choice Requires="p159">
+      <p:transition xmlns:p14="http://schemas.microsoft.com/office/powerpoint/2010/main" spd="slow" p14:dur="2000" advClick="0">
+        <p159:morph option="byObject"/>
+      </p:transition>
+    </mc:Choice>
+    <mc:Fallback xmlns="">
+      <p:transition spd="slow" advClick="0">
+        <p:fade/>
+      </p:transition>
+    </mc:Fallback>
+  </mc:AlternateContent>
+</p:sld>
+</file>
+
+<file path=ppt/slides/slide12.xml><?xml version="1.0" encoding="utf-8"?>
+<p:sld xmlns:a="http://schemas.openxmlformats.org/drawingml/2006/main" xmlns:r="http://schemas.openxmlformats.org/officeDocument/2006/relationships" xmlns:p="http://schemas.openxmlformats.org/presentationml/2006/main">
+  <p:cSld>
+    <p:spTree>
+      <p:nvGrpSpPr>
+        <p:cNvPr id="1" name=""/>
+        <p:cNvGrpSpPr/>
+        <p:nvPr/>
+      </p:nvGrpSpPr>
+      <p:grpSpPr>
+        <a:xfrm>
+          <a:off x="0" y="0"/>
+          <a:ext cx="0" cy="0"/>
+          <a:chOff x="0" y="0"/>
+          <a:chExt cx="0" cy="0"/>
+        </a:xfrm>
+      </p:grpSpPr>
+      <p:sp>
+        <p:nvSpPr>
+          <p:cNvPr id="5" name="内容占位符 4">
+            <a:extLst>
+              <a:ext uri="{FF2B5EF4-FFF2-40B4-BE49-F238E27FC236}">
+                <a16:creationId xmlns:a16="http://schemas.microsoft.com/office/drawing/2014/main" id="{AA29AF3E-12BD-804E-9A12-C93A5EDB7AF9}"/>
+              </a:ext>
+            </a:extLst>
+          </p:cNvPr>
+          <p:cNvSpPr>
+            <a:spLocks noGrp="1"/>
+          </p:cNvSpPr>
+          <p:nvPr>
+            <p:ph sz="half" idx="1"/>
+          </p:nvPr>
+        </p:nvSpPr>
+        <p:spPr/>
+        <p:txBody>
+          <a:bodyPr anchor="ctr"/>
+          <a:lstStyle/>
+          <a:p>
+            <a:pPr marL="0" indent="0" algn="ctr">
+              <a:buNone/>
+            </a:pPr>
+            <a:r>
+              <a:rPr lang="en-US" altLang="zh-CN" sz="9600" dirty="0">
+                <a:solidFill>
+                  <a:srgbClr val="C00000"/>
+                </a:solidFill>
+                <a:latin typeface="Futura Medium" panose="020B0602020204020303" pitchFamily="34" charset="-79"/>
+                <a:cs typeface="Futura Medium" panose="020B0602020204020303" pitchFamily="34" charset="-79"/>
+              </a:rPr>
+              <a:t>AI</a:t>
+            </a:r>
+            <a:r>
+              <a:rPr lang="zh-CN" altLang="en-US" sz="9600" dirty="0">
+                <a:solidFill>
+                  <a:srgbClr val="C00000"/>
+                </a:solidFill>
+                <a:latin typeface="Futura Medium" panose="020B0602020204020303" pitchFamily="34" charset="-79"/>
+                <a:cs typeface="Futura Medium" panose="020B0602020204020303" pitchFamily="34" charset="-79"/>
+              </a:rPr>
+              <a:t>编译器的</a:t>
+            </a:r>
+            <a:endParaRPr lang="en-US" altLang="zh-CN" sz="9600" dirty="0">
+              <a:solidFill>
+                <a:srgbClr val="C00000"/>
+              </a:solidFill>
+              <a:latin typeface="Futura Medium" panose="020B0602020204020303" pitchFamily="34" charset="-79"/>
+              <a:cs typeface="Futura Medium" panose="020B0602020204020303" pitchFamily="34" charset="-79"/>
+            </a:endParaRPr>
+          </a:p>
+          <a:p>
+            <a:pPr marL="0" indent="0" algn="ctr">
+              <a:buNone/>
+            </a:pPr>
+            <a:r>
+              <a:rPr lang="zh-CN" altLang="en-US" sz="9600" dirty="0">
+                <a:solidFill>
+                  <a:srgbClr val="C00000"/>
+                </a:solidFill>
+                <a:latin typeface="Futura Medium" panose="020B0602020204020303" pitchFamily="34" charset="-79"/>
+                <a:cs typeface="Futura Medium" panose="020B0602020204020303" pitchFamily="34" charset="-79"/>
+              </a:rPr>
+              <a:t>公共子表达式消除</a:t>
+            </a:r>
+            <a:endParaRPr lang="en-US" altLang="zh-CN" sz="9600" dirty="0">
+              <a:solidFill>
+                <a:srgbClr val="C00000"/>
+              </a:solidFill>
+              <a:latin typeface="Futura Medium" panose="020B0602020204020303" pitchFamily="34" charset="-79"/>
+              <a:cs typeface="Futura Medium" panose="020B0602020204020303" pitchFamily="34" charset="-79"/>
+            </a:endParaRPr>
+          </a:p>
+        </p:txBody>
+      </p:sp>
+    </p:spTree>
+    <p:extLst>
+      <p:ext uri="{BB962C8B-B14F-4D97-AF65-F5344CB8AC3E}">
+        <p14:creationId xmlns:p14="http://schemas.microsoft.com/office/powerpoint/2010/main" val="1474254781"/>
+      </p:ext>
+    </p:extLst>
+  </p:cSld>
+  <p:clrMapOvr>
+    <a:masterClrMapping/>
+  </p:clrMapOvr>
+  <mc:AlternateContent xmlns:mc="http://schemas.openxmlformats.org/markup-compatibility/2006" xmlns:p159="http://schemas.microsoft.com/office/powerpoint/2015/09/main">
+    <mc:Choice Requires="p159">
+      <p:transition spd="slow" advClick="0">
+        <p159:morph option="byObject"/>
+      </p:transition>
+    </mc:Choice>
+    <mc:Fallback xmlns="">
+      <p:transition spd="slow" advClick="0">
+        <p:fade/>
+      </p:transition>
+    </mc:Fallback>
+  </mc:AlternateContent>
+</p:sld>
+</file>
+
+<file path=ppt/slides/slide13.xml><?xml version="1.0" encoding="utf-8"?>
+<p:sld xmlns:a="http://schemas.openxmlformats.org/drawingml/2006/main" xmlns:r="http://schemas.openxmlformats.org/officeDocument/2006/relationships" xmlns:p="http://schemas.openxmlformats.org/presentationml/2006/main">
+  <p:cSld>
+    <p:spTree>
+      <p:nvGrpSpPr>
+        <p:cNvPr id="1" name=""/>
+        <p:cNvGrpSpPr/>
+        <p:nvPr/>
+      </p:nvGrpSpPr>
+      <p:grpSpPr>
+        <a:xfrm>
+          <a:off x="0" y="0"/>
+          <a:ext cx="0" cy="0"/>
+          <a:chOff x="0" y="0"/>
+          <a:chExt cx="0" cy="0"/>
+        </a:xfrm>
+      </p:grpSpPr>
+      <p:sp>
+        <p:nvSpPr>
+          <p:cNvPr id="2" name="标题 1">
+            <a:extLst>
+              <a:ext uri="{FF2B5EF4-FFF2-40B4-BE49-F238E27FC236}">
+                <a16:creationId xmlns:a16="http://schemas.microsoft.com/office/drawing/2014/main" id="{52D26926-DB13-AF4B-B20E-D896B78A5920}"/>
+              </a:ext>
+            </a:extLst>
+          </p:cNvPr>
+          <p:cNvSpPr>
+            <a:spLocks noGrp="1"/>
+          </p:cNvSpPr>
+          <p:nvPr>
+            <p:ph type="title"/>
+          </p:nvPr>
+        </p:nvSpPr>
+        <p:spPr/>
+        <p:txBody>
+          <a:bodyPr/>
+          <a:lstStyle/>
+          <a:p>
+            <a:r>
+              <a:rPr kumimoji="1" lang="en-US" altLang="zh-CN" dirty="0"/>
+              <a:t>What</a:t>
+            </a:r>
+            <a:r>
+              <a:rPr kumimoji="1" lang="zh-CN" altLang="en-US" dirty="0"/>
+              <a:t> </a:t>
+            </a:r>
+            <a:r>
+              <a:rPr kumimoji="1" lang="en-US" altLang="zh-CN" dirty="0"/>
+              <a:t>is</a:t>
+            </a:r>
+            <a:r>
+              <a:rPr kumimoji="1" lang="zh-CN" altLang="en-US" dirty="0"/>
+              <a:t> </a:t>
+            </a:r>
+            <a:r>
+              <a:rPr kumimoji="1" lang="en-US" altLang="zh-CN" dirty="0"/>
+              <a:t>?</a:t>
+            </a:r>
+            <a:endParaRPr kumimoji="1" lang="zh-CN" altLang="en-US" dirty="0"/>
+          </a:p>
+        </p:txBody>
+      </p:sp>
+      <p:sp>
+        <p:nvSpPr>
+          <p:cNvPr id="3" name="内容占位符 2">
+            <a:extLst>
+              <a:ext uri="{FF2B5EF4-FFF2-40B4-BE49-F238E27FC236}">
+                <a16:creationId xmlns:a16="http://schemas.microsoft.com/office/drawing/2014/main" id="{C8F780CB-0F8D-BC4B-A833-D48894787B05}"/>
+              </a:ext>
+            </a:extLst>
+          </p:cNvPr>
+          <p:cNvSpPr>
+            <a:spLocks noGrp="1"/>
+          </p:cNvSpPr>
+          <p:nvPr>
+            <p:ph sz="half" idx="1"/>
+          </p:nvPr>
+        </p:nvSpPr>
+        <p:spPr/>
+        <p:txBody>
+          <a:bodyPr/>
+          <a:lstStyle/>
+          <a:p>
+            <a:r>
+              <a:rPr lang="zh-CN" altLang="en-US" dirty="0">
+                <a:latin typeface="Gill Sans MT" panose="020B0502020104020203" pitchFamily="34" charset="0"/>
+              </a:rPr>
+              <a:t>对于公共子表达式，只需要计算其中一个表达式的值，其他表达式的值可以通过赋值得到。</a:t>
+            </a:r>
+            <a:endParaRPr lang="en-US" altLang="zh-CN" dirty="0">
+              <a:latin typeface="Gill Sans MT" panose="020B0502020104020203" pitchFamily="34" charset="0"/>
+            </a:endParaRPr>
+          </a:p>
+          <a:p>
+            <a:endParaRPr lang="en-US" altLang="zh-CN" dirty="0">
+              <a:latin typeface="Gill Sans MT" panose="020B0502020104020203" pitchFamily="34" charset="0"/>
+            </a:endParaRPr>
+          </a:p>
+          <a:p>
+            <a:r>
+              <a:rPr lang="zh-CN" altLang="en-US" dirty="0">
+                <a:latin typeface="Gill Sans MT" panose="020B0502020104020203" pitchFamily="34" charset="0"/>
+              </a:rPr>
+              <a:t>这个过程就称作公共子表达式消除，它是一种传统编译器中常用的优化手段，经过迁移也可以应用到深度学习编译器中。</a:t>
+            </a:r>
+            <a:endParaRPr kumimoji="1" lang="zh-CN" altLang="en-US" dirty="0">
+              <a:latin typeface="Gill Sans MT" panose="020B0502020104020203" pitchFamily="34" charset="0"/>
+            </a:endParaRPr>
+          </a:p>
+        </p:txBody>
+      </p:sp>
+    </p:spTree>
+    <p:extLst>
+      <p:ext uri="{BB962C8B-B14F-4D97-AF65-F5344CB8AC3E}">
+        <p14:creationId xmlns:p14="http://schemas.microsoft.com/office/powerpoint/2010/main" val="3950148761"/>
+      </p:ext>
+    </p:extLst>
+  </p:cSld>
+  <p:clrMapOvr>
+    <a:masterClrMapping/>
+  </p:clrMapOvr>
+  <mc:AlternateContent xmlns:mc="http://schemas.openxmlformats.org/markup-compatibility/2006" xmlns:p159="http://schemas.microsoft.com/office/powerpoint/2015/09/main">
+    <mc:Choice Requires="p159">
+      <p:transition xmlns:p14="http://schemas.microsoft.com/office/powerpoint/2010/main" spd="slow" p14:dur="2000" advClick="0">
+        <p159:morph option="byObject"/>
+      </p:transition>
+    </mc:Choice>
+    <mc:Fallback xmlns="">
+      <p:transition spd="slow" advClick="0">
+        <p:fade/>
+      </p:transition>
+    </mc:Fallback>
+  </mc:AlternateContent>
+</p:sld>
+</file>
+
+<file path=ppt/slides/slide14.xml><?xml version="1.0" encoding="utf-8"?>
+<p:sld xmlns:a="http://schemas.openxmlformats.org/drawingml/2006/main" xmlns:r="http://schemas.openxmlformats.org/officeDocument/2006/relationships" xmlns:p="http://schemas.openxmlformats.org/presentationml/2006/main">
+  <p:cSld>
+    <p:spTree>
+      <p:nvGrpSpPr>
+        <p:cNvPr id="1" name=""/>
+        <p:cNvGrpSpPr/>
+        <p:nvPr/>
+      </p:nvGrpSpPr>
+      <p:grpSpPr>
+        <a:xfrm>
+          <a:off x="0" y="0"/>
+          <a:ext cx="0" cy="0"/>
+          <a:chOff x="0" y="0"/>
+          <a:chExt cx="0" cy="0"/>
+        </a:xfrm>
+      </p:grpSpPr>
+      <p:sp>
+        <p:nvSpPr>
+          <p:cNvPr id="2" name="标题 1">
+            <a:extLst>
+              <a:ext uri="{FF2B5EF4-FFF2-40B4-BE49-F238E27FC236}">
+                <a16:creationId xmlns:a16="http://schemas.microsoft.com/office/drawing/2014/main" id="{52D26926-DB13-AF4B-B20E-D896B78A5920}"/>
+              </a:ext>
+            </a:extLst>
+          </p:cNvPr>
+          <p:cNvSpPr>
+            <a:spLocks noGrp="1"/>
+          </p:cNvSpPr>
+          <p:nvPr>
+            <p:ph type="title"/>
+          </p:nvPr>
+        </p:nvSpPr>
+        <p:spPr/>
+        <p:txBody>
+          <a:bodyPr/>
+          <a:lstStyle/>
+          <a:p>
+            <a:r>
+              <a:rPr kumimoji="1" lang="en-US" altLang="zh-CN" dirty="0"/>
+              <a:t>What</a:t>
+            </a:r>
+            <a:r>
+              <a:rPr kumimoji="1" lang="zh-CN" altLang="en-US" dirty="0"/>
+              <a:t> </a:t>
+            </a:r>
+            <a:r>
+              <a:rPr kumimoji="1" lang="en-US" altLang="zh-CN" dirty="0"/>
+              <a:t>is</a:t>
+            </a:r>
+            <a:r>
+              <a:rPr kumimoji="1" lang="zh-CN" altLang="en-US" dirty="0"/>
+              <a:t> </a:t>
+            </a:r>
+            <a:r>
+              <a:rPr kumimoji="1" lang="en-US" altLang="zh-CN" dirty="0"/>
+              <a:t>?</a:t>
+            </a:r>
+            <a:endParaRPr kumimoji="1" lang="zh-CN" altLang="en-US" dirty="0"/>
+          </a:p>
+        </p:txBody>
+      </p:sp>
+      <p:sp>
+        <p:nvSpPr>
+          <p:cNvPr id="3" name="内容占位符 2">
+            <a:extLst>
+              <a:ext uri="{FF2B5EF4-FFF2-40B4-BE49-F238E27FC236}">
+                <a16:creationId xmlns:a16="http://schemas.microsoft.com/office/drawing/2014/main" id="{C8F780CB-0F8D-BC4B-A833-D48894787B05}"/>
+              </a:ext>
+            </a:extLst>
+          </p:cNvPr>
+          <p:cNvSpPr>
+            <a:spLocks noGrp="1"/>
+          </p:cNvSpPr>
+          <p:nvPr>
+            <p:ph sz="half" idx="1"/>
+          </p:nvPr>
+        </p:nvSpPr>
+        <p:spPr/>
+        <p:txBody>
+          <a:bodyPr/>
+          <a:lstStyle/>
+          <a:p>
+            <a:pPr marL="0" indent="0">
+              <a:lnSpc>
+                <a:spcPct val="150000"/>
+              </a:lnSpc>
+              <a:buNone/>
+            </a:pPr>
+            <a:r>
+              <a:rPr kumimoji="1" lang="en-US" altLang="zh-CN" dirty="0">
+                <a:latin typeface="Gill Sans MT" panose="020B0502020104020203" pitchFamily="34" charset="0"/>
+              </a:rPr>
+              <a:t>AI</a:t>
+            </a:r>
+            <a:r>
+              <a:rPr kumimoji="1" lang="zh-CN" altLang="en-US" dirty="0">
+                <a:latin typeface="Gill Sans MT" panose="020B0502020104020203" pitchFamily="34" charset="0"/>
+              </a:rPr>
+              <a:t> 编译器中公共子表达式消除采取相同的思路，区别在于</a:t>
+            </a:r>
+            <a:r>
+              <a:rPr kumimoji="1" lang="en-US" altLang="zh-CN" dirty="0">
+                <a:latin typeface="Gill Sans MT" panose="020B0502020104020203" pitchFamily="34" charset="0"/>
+              </a:rPr>
+              <a:t>AI</a:t>
+            </a:r>
+            <a:r>
+              <a:rPr kumimoji="1" lang="zh-CN" altLang="en-US" dirty="0">
+                <a:latin typeface="Gill Sans MT" panose="020B0502020104020203" pitchFamily="34" charset="0"/>
+              </a:rPr>
+              <a:t>编译器中子表达式是基于计算图或者图层 </a:t>
+            </a:r>
+            <a:r>
+              <a:rPr kumimoji="1" lang="en-US" altLang="zh-CN" dirty="0">
+                <a:latin typeface="Gill Sans MT" panose="020B0502020104020203" pitchFamily="34" charset="0"/>
+              </a:rPr>
+              <a:t>IR</a:t>
+            </a:r>
+            <a:r>
+              <a:rPr kumimoji="1" lang="zh-CN" altLang="en-US" dirty="0">
+                <a:latin typeface="Gill Sans MT" panose="020B0502020104020203" pitchFamily="34" charset="0"/>
+              </a:rPr>
+              <a:t>。通过在计算图中搜索相同结构的子图，简化计算图的结构，从而减少计算开销。</a:t>
+            </a:r>
+          </a:p>
+        </p:txBody>
+      </p:sp>
+      <p:pic>
+        <p:nvPicPr>
+          <p:cNvPr id="4" name="图片 3">
+            <a:extLst>
+              <a:ext uri="{FF2B5EF4-FFF2-40B4-BE49-F238E27FC236}">
+                <a16:creationId xmlns:a16="http://schemas.microsoft.com/office/drawing/2014/main" id="{AEDBCF31-12C1-0C41-88AF-F9E1CC82059F}"/>
+              </a:ext>
+            </a:extLst>
+          </p:cNvPr>
+          <p:cNvPicPr>
+            <a:picLocks noChangeAspect="1"/>
+          </p:cNvPicPr>
+          <p:nvPr/>
+        </p:nvPicPr>
+        <p:blipFill>
+          <a:blip r:embed="rId2"/>
+          <a:stretch>
+            <a:fillRect/>
+          </a:stretch>
+        </p:blipFill>
+        <p:spPr>
+          <a:xfrm>
+            <a:off x="2137941" y="2798034"/>
+            <a:ext cx="2776987" cy="3181478"/>
+          </a:xfrm>
+          <a:prstGeom prst="rect">
+            <a:avLst/>
+          </a:prstGeom>
+        </p:spPr>
+      </p:pic>
+      <p:pic>
+        <p:nvPicPr>
+          <p:cNvPr id="5" name="图片 4">
+            <a:extLst>
+              <a:ext uri="{FF2B5EF4-FFF2-40B4-BE49-F238E27FC236}">
+                <a16:creationId xmlns:a16="http://schemas.microsoft.com/office/drawing/2014/main" id="{57999F79-62E1-3149-8DA1-7CBC7643EA39}"/>
+              </a:ext>
+            </a:extLst>
+          </p:cNvPr>
+          <p:cNvPicPr>
+            <a:picLocks noChangeAspect="1"/>
+          </p:cNvPicPr>
+          <p:nvPr/>
+        </p:nvPicPr>
+        <p:blipFill>
+          <a:blip r:embed="rId3"/>
+          <a:stretch>
+            <a:fillRect/>
+          </a:stretch>
+        </p:blipFill>
+        <p:spPr>
+          <a:xfrm>
+            <a:off x="6962477" y="2787115"/>
+            <a:ext cx="2796049" cy="3203317"/>
+          </a:xfrm>
+          <a:prstGeom prst="rect">
+            <a:avLst/>
+          </a:prstGeom>
+        </p:spPr>
+      </p:pic>
+    </p:spTree>
+    <p:extLst>
+      <p:ext uri="{BB962C8B-B14F-4D97-AF65-F5344CB8AC3E}">
+        <p14:creationId xmlns:p14="http://schemas.microsoft.com/office/powerpoint/2010/main" val="75505965"/>
+      </p:ext>
+    </p:extLst>
+  </p:cSld>
+  <p:clrMapOvr>
+    <a:masterClrMapping/>
+  </p:clrMapOvr>
+  <mc:AlternateContent xmlns:mc="http://schemas.openxmlformats.org/markup-compatibility/2006" xmlns:p159="http://schemas.microsoft.com/office/powerpoint/2015/09/main">
+    <mc:Choice Requires="p159">
+      <p:transition xmlns:p14="http://schemas.microsoft.com/office/powerpoint/2010/main" spd="slow" p14:dur="2000" advClick="0">
+        <p159:morph option="byObject"/>
+      </p:transition>
+    </mc:Choice>
+    <mc:Fallback xmlns="">
+      <p:transition spd="slow" advClick="0">
+        <p:fade/>
+      </p:transition>
+    </mc:Fallback>
+  </mc:AlternateContent>
+</p:sld>
+</file>
+
+<file path=ppt/slides/slide15.xml><?xml version="1.0" encoding="utf-8"?>
+<p:sld xmlns:a="http://schemas.openxmlformats.org/drawingml/2006/main" xmlns:r="http://schemas.openxmlformats.org/officeDocument/2006/relationships" xmlns:p="http://schemas.openxmlformats.org/presentationml/2006/main">
+  <p:cSld>
+    <p:spTree>
+      <p:nvGrpSpPr>
+        <p:cNvPr id="1" name=""/>
+        <p:cNvGrpSpPr/>
+        <p:nvPr/>
+      </p:nvGrpSpPr>
+      <p:grpSpPr>
+        <a:xfrm>
+          <a:off x="0" y="0"/>
+          <a:ext cx="0" cy="0"/>
+          <a:chOff x="0" y="0"/>
+          <a:chExt cx="0" cy="0"/>
+        </a:xfrm>
+      </p:grpSpPr>
+      <p:sp>
+        <p:nvSpPr>
+          <p:cNvPr id="2" name="标题 1">
+            <a:extLst>
+              <a:ext uri="{FF2B5EF4-FFF2-40B4-BE49-F238E27FC236}">
+                <a16:creationId xmlns:a16="http://schemas.microsoft.com/office/drawing/2014/main" id="{7F17CBD7-EB9D-8245-BA05-8784F54B958D}"/>
+              </a:ext>
+            </a:extLst>
+          </p:cNvPr>
+          <p:cNvSpPr>
+            <a:spLocks noGrp="1"/>
+          </p:cNvSpPr>
+          <p:nvPr>
+            <p:ph type="title"/>
+          </p:nvPr>
+        </p:nvSpPr>
+        <p:spPr/>
+        <p:txBody>
+          <a:bodyPr/>
+          <a:lstStyle/>
+          <a:p>
+            <a:r>
+              <a:rPr lang="en-US" altLang="zh-CN" dirty="0"/>
+              <a:t>Principle</a:t>
+            </a:r>
+            <a:endParaRPr kumimoji="1" lang="zh-CN" altLang="en-US" dirty="0"/>
+          </a:p>
+        </p:txBody>
+      </p:sp>
+      <p:sp>
+        <p:nvSpPr>
+          <p:cNvPr id="3" name="内容占位符 2">
+            <a:extLst>
+              <a:ext uri="{FF2B5EF4-FFF2-40B4-BE49-F238E27FC236}">
+                <a16:creationId xmlns:a16="http://schemas.microsoft.com/office/drawing/2014/main" id="{148CB98C-8C45-654E-8AD6-DEC0655DFDA2}"/>
+              </a:ext>
+            </a:extLst>
+          </p:cNvPr>
+          <p:cNvSpPr>
+            <a:spLocks noGrp="1"/>
+          </p:cNvSpPr>
+          <p:nvPr>
+            <p:ph sz="half" idx="1"/>
+          </p:nvPr>
+        </p:nvSpPr>
+        <p:spPr/>
+        <p:txBody>
+          <a:bodyPr/>
+          <a:lstStyle/>
+          <a:p>
+            <a:pPr>
+              <a:lnSpc>
+                <a:spcPct val="150000"/>
+              </a:lnSpc>
+            </a:pPr>
+            <a:r>
+              <a:rPr lang="zh-CN" altLang="en-US" dirty="0">
+                <a:latin typeface="Gill Sans MT" panose="020B0502020104020203" pitchFamily="34" charset="0"/>
+                <a:ea typeface="Microsoft YaHei" panose="020B0503020204020204" pitchFamily="34" charset="-122"/>
+              </a:rPr>
+              <a:t>通过建立</a:t>
+            </a:r>
+            <a:r>
+              <a:rPr lang="zh-CN" altLang="en-US" dirty="0">
+                <a:highlight>
+                  <a:srgbClr val="FFFF00"/>
+                </a:highlight>
+                <a:latin typeface="Gill Sans MT" panose="020B0502020104020203" pitchFamily="34" charset="0"/>
+                <a:ea typeface="Microsoft YaHei" panose="020B0503020204020204" pitchFamily="34" charset="-122"/>
+              </a:rPr>
+              <a:t>候选哈希表 </a:t>
+            </a:r>
+            <a:r>
+              <a:rPr lang="en-US" altLang="zh-CN" dirty="0">
+                <a:highlight>
+                  <a:srgbClr val="FFFF00"/>
+                </a:highlight>
+                <a:latin typeface="Gill Sans MT" panose="020B0502020104020203" pitchFamily="34" charset="0"/>
+                <a:ea typeface="Microsoft YaHei" panose="020B0503020204020204" pitchFamily="34" charset="-122"/>
+              </a:rPr>
+              <a:t>MAP</a:t>
+            </a:r>
+            <a:r>
+              <a:rPr lang="en-US" altLang="zh-CN" dirty="0">
+                <a:latin typeface="Gill Sans MT" panose="020B0502020104020203" pitchFamily="34" charset="0"/>
+                <a:ea typeface="Microsoft YaHei" panose="020B0503020204020204" pitchFamily="34" charset="-122"/>
+              </a:rPr>
+              <a:t>, </a:t>
+            </a:r>
+            <a:r>
+              <a:rPr lang="zh-CN" altLang="en-US" dirty="0">
+                <a:latin typeface="Gill Sans MT" panose="020B0502020104020203" pitchFamily="34" charset="0"/>
+                <a:ea typeface="Microsoft YaHei" panose="020B0503020204020204" pitchFamily="34" charset="-122"/>
+              </a:rPr>
+              <a:t>记录已处理过的同一种类型的 </a:t>
+            </a:r>
+            <a:r>
+              <a:rPr lang="en-US" altLang="zh-CN" dirty="0">
+                <a:latin typeface="Gill Sans MT" panose="020B0502020104020203" pitchFamily="34" charset="0"/>
+                <a:ea typeface="Microsoft YaHei" panose="020B0503020204020204" pitchFamily="34" charset="-122"/>
+              </a:rPr>
+              <a:t>OP</a:t>
+            </a:r>
+            <a:r>
+              <a:rPr lang="zh-CN" altLang="en-US" dirty="0">
+                <a:latin typeface="Gill Sans MT" panose="020B0502020104020203" pitchFamily="34" charset="0"/>
+                <a:ea typeface="Microsoft YaHei" panose="020B0503020204020204" pitchFamily="34" charset="-122"/>
+              </a:rPr>
+              <a:t>。对于当前正在处理的 </a:t>
+            </a:r>
+            <a:r>
+              <a:rPr lang="en-US" altLang="zh-CN" dirty="0">
+                <a:latin typeface="Gill Sans MT" panose="020B0502020104020203" pitchFamily="34" charset="0"/>
+                <a:ea typeface="Microsoft YaHei" panose="020B0503020204020204" pitchFamily="34" charset="-122"/>
+              </a:rPr>
+              <a:t>OP</a:t>
+            </a:r>
+            <a:r>
+              <a:rPr lang="zh-CN" altLang="en-US" dirty="0">
+                <a:latin typeface="Gill Sans MT" panose="020B0502020104020203" pitchFamily="34" charset="0"/>
+                <a:ea typeface="Microsoft YaHei" panose="020B0503020204020204" pitchFamily="34" charset="-122"/>
+              </a:rPr>
+              <a:t>，先查找该 </a:t>
+            </a:r>
+            <a:r>
+              <a:rPr lang="en-US" altLang="zh-CN" dirty="0">
+                <a:latin typeface="Gill Sans MT" panose="020B0502020104020203" pitchFamily="34" charset="0"/>
+                <a:ea typeface="Microsoft YaHei" panose="020B0503020204020204" pitchFamily="34" charset="-122"/>
+              </a:rPr>
+              <a:t>MAP </a:t>
+            </a:r>
+            <a:r>
+              <a:rPr lang="zh-CN" altLang="en-US" dirty="0">
+                <a:latin typeface="Gill Sans MT" panose="020B0502020104020203" pitchFamily="34" charset="0"/>
+                <a:ea typeface="Microsoft YaHei" panose="020B0503020204020204" pitchFamily="34" charset="-122"/>
+              </a:rPr>
+              <a:t>表，如果能找到其他和正在处理的 </a:t>
+            </a:r>
+            <a:r>
+              <a:rPr lang="en-US" altLang="zh-CN" dirty="0">
+                <a:latin typeface="Gill Sans MT" panose="020B0502020104020203" pitchFamily="34" charset="0"/>
+                <a:ea typeface="Microsoft YaHei" panose="020B0503020204020204" pitchFamily="34" charset="-122"/>
+              </a:rPr>
+              <a:t>OP </a:t>
+            </a:r>
+            <a:r>
+              <a:rPr lang="zh-CN" altLang="en-US" dirty="0">
+                <a:latin typeface="Gill Sans MT" panose="020B0502020104020203" pitchFamily="34" charset="0"/>
+                <a:ea typeface="Microsoft YaHei" panose="020B0503020204020204" pitchFamily="34" charset="-122"/>
+              </a:rPr>
+              <a:t>类型相同的 </a:t>
+            </a:r>
+            <a:r>
+              <a:rPr lang="en-US" altLang="zh-CN" dirty="0">
+                <a:latin typeface="Gill Sans MT" panose="020B0502020104020203" pitchFamily="34" charset="0"/>
+                <a:ea typeface="Microsoft YaHei" panose="020B0503020204020204" pitchFamily="34" charset="-122"/>
+              </a:rPr>
+              <a:t>OP</a:t>
+            </a:r>
+            <a:r>
+              <a:rPr lang="zh-CN" altLang="en-US" dirty="0">
+                <a:latin typeface="Gill Sans MT" panose="020B0502020104020203" pitchFamily="34" charset="0"/>
+                <a:ea typeface="Microsoft YaHei" panose="020B0503020204020204" pitchFamily="34" charset="-122"/>
+              </a:rPr>
+              <a:t>，则对其进行遍历，如果其中某个 </a:t>
+            </a:r>
+            <a:r>
+              <a:rPr lang="en-US" altLang="zh-CN" dirty="0">
+                <a:latin typeface="Gill Sans MT" panose="020B0502020104020203" pitchFamily="34" charset="0"/>
+                <a:ea typeface="Microsoft YaHei" panose="020B0503020204020204" pitchFamily="34" charset="-122"/>
+              </a:rPr>
+              <a:t>OP </a:t>
+            </a:r>
+            <a:r>
+              <a:rPr lang="zh-CN" altLang="en-US" dirty="0">
+                <a:latin typeface="Gill Sans MT" panose="020B0502020104020203" pitchFamily="34" charset="0"/>
+                <a:ea typeface="Microsoft YaHei" panose="020B0503020204020204" pitchFamily="34" charset="-122"/>
+              </a:rPr>
+              <a:t>的输入和参数与当前正在处理的 </a:t>
+            </a:r>
+            <a:r>
+              <a:rPr lang="en-US" altLang="zh-CN" dirty="0">
+                <a:latin typeface="Gill Sans MT" panose="020B0502020104020203" pitchFamily="34" charset="0"/>
+                <a:ea typeface="Microsoft YaHei" panose="020B0503020204020204" pitchFamily="34" charset="-122"/>
+              </a:rPr>
+              <a:t>OP </a:t>
+            </a:r>
+            <a:r>
+              <a:rPr lang="zh-CN" altLang="en-US" dirty="0">
+                <a:latin typeface="Gill Sans MT" panose="020B0502020104020203" pitchFamily="34" charset="0"/>
+                <a:ea typeface="Microsoft YaHei" panose="020B0503020204020204" pitchFamily="34" charset="-122"/>
+              </a:rPr>
+              <a:t>相同，则它们为公共子表达式，结果可以互相替代；如果所有 </a:t>
+            </a:r>
+            <a:r>
+              <a:rPr lang="en-US" altLang="zh-CN" dirty="0">
+                <a:latin typeface="Gill Sans MT" panose="020B0502020104020203" pitchFamily="34" charset="0"/>
+                <a:ea typeface="Microsoft YaHei" panose="020B0503020204020204" pitchFamily="34" charset="-122"/>
+              </a:rPr>
+              <a:t>OP </a:t>
+            </a:r>
+            <a:r>
+              <a:rPr lang="zh-CN" altLang="en-US" dirty="0">
+                <a:latin typeface="Gill Sans MT" panose="020B0502020104020203" pitchFamily="34" charset="0"/>
+                <a:ea typeface="Microsoft YaHei" panose="020B0503020204020204" pitchFamily="34" charset="-122"/>
+              </a:rPr>
+              <a:t>都不能与当前正在处理的 </a:t>
+            </a:r>
+            <a:r>
+              <a:rPr lang="en-US" altLang="zh-CN" dirty="0">
+                <a:latin typeface="Gill Sans MT" panose="020B0502020104020203" pitchFamily="34" charset="0"/>
+                <a:ea typeface="Microsoft YaHei" panose="020B0503020204020204" pitchFamily="34" charset="-122"/>
+              </a:rPr>
+              <a:t>OP </a:t>
+            </a:r>
+            <a:r>
+              <a:rPr lang="zh-CN" altLang="en-US" dirty="0">
+                <a:latin typeface="Gill Sans MT" panose="020B0502020104020203" pitchFamily="34" charset="0"/>
+                <a:ea typeface="Microsoft YaHei" panose="020B0503020204020204" pitchFamily="34" charset="-122"/>
+              </a:rPr>
+              <a:t>匹配，则将当前 </a:t>
+            </a:r>
+            <a:r>
+              <a:rPr lang="en-US" altLang="zh-CN" dirty="0">
+                <a:latin typeface="Gill Sans MT" panose="020B0502020104020203" pitchFamily="34" charset="0"/>
+                <a:ea typeface="Microsoft YaHei" panose="020B0503020204020204" pitchFamily="34" charset="-122"/>
+              </a:rPr>
+              <a:t>OP </a:t>
+            </a:r>
+            <a:r>
+              <a:rPr lang="zh-CN" altLang="en-US" dirty="0">
+                <a:latin typeface="Gill Sans MT" panose="020B0502020104020203" pitchFamily="34" charset="0"/>
+                <a:ea typeface="Microsoft YaHei" panose="020B0503020204020204" pitchFamily="34" charset="-122"/>
+              </a:rPr>
+              <a:t>复制一份回。</a:t>
+            </a:r>
+          </a:p>
+        </p:txBody>
+      </p:sp>
+    </p:spTree>
+    <p:extLst>
+      <p:ext uri="{BB962C8B-B14F-4D97-AF65-F5344CB8AC3E}">
+        <p14:creationId xmlns:p14="http://schemas.microsoft.com/office/powerpoint/2010/main" val="1561908284"/>
+      </p:ext>
+    </p:extLst>
+  </p:cSld>
+  <p:clrMapOvr>
+    <a:masterClrMapping/>
+  </p:clrMapOvr>
+  <mc:AlternateContent xmlns:mc="http://schemas.openxmlformats.org/markup-compatibility/2006" xmlns:p159="http://schemas.microsoft.com/office/powerpoint/2015/09/main">
+    <mc:Choice Requires="p159">
+      <p:transition xmlns:p14="http://schemas.microsoft.com/office/powerpoint/2010/main" spd="slow" p14:dur="2000" advClick="0">
+        <p159:morph option="byObject"/>
+      </p:transition>
+    </mc:Choice>
+    <mc:Fallback xmlns="">
+      <p:transition spd="slow" advClick="0">
+        <p:fade/>
+      </p:transition>
+    </mc:Fallback>
+  </mc:AlternateContent>
+</p:sld>
+</file>
+
+<file path=ppt/slides/slide16.xml><?xml version="1.0" encoding="utf-8"?>
+<p:sld xmlns:a="http://schemas.openxmlformats.org/drawingml/2006/main" xmlns:r="http://schemas.openxmlformats.org/officeDocument/2006/relationships" xmlns:p="http://schemas.openxmlformats.org/presentationml/2006/main">
+  <p:cSld>
+    <p:spTree>
+      <p:nvGrpSpPr>
+        <p:cNvPr id="1" name=""/>
+        <p:cNvGrpSpPr/>
+        <p:nvPr/>
+      </p:nvGrpSpPr>
+      <p:grpSpPr>
+        <a:xfrm>
+          <a:off x="0" y="0"/>
+          <a:ext cx="0" cy="0"/>
+          <a:chOff x="0" y="0"/>
+          <a:chExt cx="0" cy="0"/>
+        </a:xfrm>
+      </p:grpSpPr>
+      <p:sp>
+        <p:nvSpPr>
+          <p:cNvPr id="4" name="标题 3">
+            <a:extLst>
+              <a:ext uri="{FF2B5EF4-FFF2-40B4-BE49-F238E27FC236}">
+                <a16:creationId xmlns:a16="http://schemas.microsoft.com/office/drawing/2014/main" id="{7BD9286B-F655-604C-BA14-712B46499FC3}"/>
+              </a:ext>
+            </a:extLst>
+          </p:cNvPr>
+          <p:cNvSpPr>
+            <a:spLocks noGrp="1"/>
+          </p:cNvSpPr>
+          <p:nvPr>
+            <p:ph type="title"/>
+          </p:nvPr>
+        </p:nvSpPr>
+        <p:spPr/>
+        <p:txBody>
+          <a:bodyPr/>
+          <a:lstStyle/>
+          <a:p>
+            <a:r>
+              <a:rPr kumimoji="1" lang="en-US" altLang="zh-CN" dirty="0"/>
+              <a:t>Algorithm</a:t>
+            </a:r>
+            <a:endParaRPr lang="zh-CN" altLang="en-US" dirty="0"/>
+          </a:p>
+        </p:txBody>
+      </p:sp>
+      <p:sp>
+        <p:nvSpPr>
+          <p:cNvPr id="5" name="内容占位符 4">
+            <a:extLst>
+              <a:ext uri="{FF2B5EF4-FFF2-40B4-BE49-F238E27FC236}">
+                <a16:creationId xmlns:a16="http://schemas.microsoft.com/office/drawing/2014/main" id="{775DB1BA-EEC2-E84B-8AB9-E616BBF61F3F}"/>
+              </a:ext>
+            </a:extLst>
+          </p:cNvPr>
+          <p:cNvSpPr>
+            <a:spLocks noGrp="1"/>
+          </p:cNvSpPr>
+          <p:nvPr>
+            <p:ph sz="half" idx="1"/>
+          </p:nvPr>
+        </p:nvSpPr>
+        <p:spPr/>
+        <p:txBody>
+          <a:bodyPr/>
+          <a:lstStyle/>
+          <a:p>
+            <a:pPr marL="0" indent="0" eaLnBrk="1" latinLnBrk="1" hangingPunct="1">
+              <a:lnSpc>
+                <a:spcPct val="150000"/>
+              </a:lnSpc>
+              <a:buNone/>
+            </a:pPr>
+            <a:r>
+              <a:rPr lang="zh-CN" altLang="en-US" sz="1800" dirty="0">
+                <a:latin typeface="Gill Sans MT" panose="020B0502020104020203" pitchFamily="34" charset="0"/>
+              </a:rPr>
+              <a:t>输入：计算图 </a:t>
+            </a:r>
+            <a:r>
+              <a:rPr lang="en-US" altLang="zh-CN" sz="1800" dirty="0">
+                <a:latin typeface="Gill Sans MT" panose="020B0502020104020203" pitchFamily="34" charset="0"/>
+              </a:rPr>
+              <a:t>Graph</a:t>
+            </a:r>
+            <a:r>
+              <a:rPr lang="zh-CN" altLang="en-US" sz="1800" dirty="0">
+                <a:latin typeface="Gill Sans MT" panose="020B0502020104020203" pitchFamily="34" charset="0"/>
+              </a:rPr>
+              <a:t> </a:t>
+            </a:r>
+            <a:r>
+              <a:rPr lang="en-US" altLang="zh-CN" sz="1800" dirty="0">
+                <a:latin typeface="Gill Sans MT" panose="020B0502020104020203" pitchFamily="34" charset="0"/>
+              </a:rPr>
+              <a:t>IR</a:t>
+            </a:r>
+            <a:r>
+              <a:rPr lang="zh-CN" altLang="en-US" sz="1800" dirty="0">
+                <a:latin typeface="Gill Sans MT" panose="020B0502020104020203" pitchFamily="34" charset="0"/>
+              </a:rPr>
+              <a:t>，找到公共子表达式并优化计算图：</a:t>
+            </a:r>
+            <a:endParaRPr lang="en-US" altLang="zh-CN" sz="1800" dirty="0">
+              <a:latin typeface="Gill Sans MT" panose="020B0502020104020203" pitchFamily="34" charset="0"/>
+            </a:endParaRPr>
+          </a:p>
+          <a:p>
+            <a:pPr marL="0" indent="0" eaLnBrk="1" latinLnBrk="1" hangingPunct="1">
+              <a:lnSpc>
+                <a:spcPct val="150000"/>
+              </a:lnSpc>
+              <a:buNone/>
+            </a:pPr>
+            <a:endParaRPr lang="en-US" altLang="zh-CN" sz="1800" dirty="0">
+              <a:highlight>
+                <a:srgbClr val="FFFF00"/>
+              </a:highlight>
+              <a:latin typeface="Gill Sans MT" panose="020B0502020104020203" pitchFamily="34" charset="0"/>
+            </a:endParaRPr>
+          </a:p>
+          <a:p>
+            <a:pPr marL="457200" indent="-457200" eaLnBrk="1" latinLnBrk="1" hangingPunct="1">
+              <a:lnSpc>
+                <a:spcPct val="150000"/>
+              </a:lnSpc>
+              <a:buFont typeface="+mj-lt"/>
+              <a:buAutoNum type="arabicPeriod"/>
+            </a:pPr>
+            <a:r>
+              <a:rPr lang="zh-CN" altLang="en-US" sz="1800" dirty="0">
+                <a:highlight>
+                  <a:srgbClr val="FFFF00"/>
+                </a:highlight>
+                <a:latin typeface="Gill Sans MT" panose="020B0502020104020203" pitchFamily="34" charset="0"/>
+              </a:rPr>
+              <a:t>获取逆后续节点集 </a:t>
+            </a:r>
+            <a:r>
+              <a:rPr lang="en-US" altLang="zh-CN" sz="1800" dirty="0">
+                <a:highlight>
+                  <a:srgbClr val="FFFF00"/>
+                </a:highlight>
+                <a:latin typeface="Gill Sans MT" panose="020B0502020104020203" pitchFamily="34" charset="0"/>
+              </a:rPr>
+              <a:t>Set(Reverse)</a:t>
+            </a:r>
+            <a:r>
+              <a:rPr lang="zh-CN" altLang="en-US" sz="1800" dirty="0">
+                <a:latin typeface="Gill Sans MT" panose="020B0502020104020203" pitchFamily="34" charset="0"/>
+              </a:rPr>
+              <a:t>：对计算图 </a:t>
+            </a:r>
+            <a:r>
+              <a:rPr lang="en-US" altLang="zh-CN" sz="1800" dirty="0">
+                <a:latin typeface="Gill Sans MT" panose="020B0502020104020203" pitchFamily="34" charset="0"/>
+              </a:rPr>
+              <a:t>Graph</a:t>
+            </a:r>
+            <a:r>
+              <a:rPr lang="zh-CN" altLang="en-US" sz="1800" dirty="0">
+                <a:latin typeface="Gill Sans MT" panose="020B0502020104020203" pitchFamily="34" charset="0"/>
+              </a:rPr>
+              <a:t> </a:t>
+            </a:r>
+            <a:r>
+              <a:rPr lang="en-US" altLang="zh-CN" sz="1800" dirty="0">
+                <a:latin typeface="Gill Sans MT" panose="020B0502020104020203" pitchFamily="34" charset="0"/>
+              </a:rPr>
+              <a:t>IR</a:t>
+            </a:r>
+            <a:r>
+              <a:rPr lang="zh-CN" altLang="en-US" sz="1800" dirty="0">
+                <a:latin typeface="Gill Sans MT" panose="020B0502020104020203" pitchFamily="34" charset="0"/>
+              </a:rPr>
+              <a:t> 进行深度优先遍历 </a:t>
+            </a:r>
+            <a:r>
+              <a:rPr lang="en-US" altLang="zh-CN" sz="1800" dirty="0">
+                <a:latin typeface="Gill Sans MT" panose="020B0502020104020203" pitchFamily="34" charset="0"/>
+              </a:rPr>
+              <a:t>DFS</a:t>
+            </a:r>
+            <a:r>
+              <a:rPr lang="zh-CN" altLang="en-US" sz="1800" dirty="0">
+                <a:latin typeface="Gill Sans MT" panose="020B0502020104020203" pitchFamily="34" charset="0"/>
+              </a:rPr>
+              <a:t>，将结果逆转得到逆后续节点集。逆后续得到的结果就是拓扑排序，即访问到某一个节点时，该节点的依赖节点都已经被访问。</a:t>
+            </a:r>
+          </a:p>
+          <a:p>
+            <a:pPr marL="457200" indent="-457200" eaLnBrk="1" latinLnBrk="1" hangingPunct="1">
+              <a:lnSpc>
+                <a:spcPct val="150000"/>
+              </a:lnSpc>
+              <a:buFont typeface="+mj-lt"/>
+              <a:buAutoNum type="arabicPeriod"/>
+            </a:pPr>
+            <a:r>
+              <a:rPr lang="zh-CN" altLang="en-US" sz="1800" dirty="0">
+                <a:highlight>
+                  <a:srgbClr val="FFFF00"/>
+                </a:highlight>
+                <a:latin typeface="Gill Sans MT" panose="020B0502020104020203" pitchFamily="34" charset="0"/>
+              </a:rPr>
+              <a:t>创建 </a:t>
+            </a:r>
+            <a:r>
+              <a:rPr lang="en-US" altLang="zh-CN" sz="1800" dirty="0">
+                <a:highlight>
+                  <a:srgbClr val="FFFF00"/>
+                </a:highlight>
+                <a:latin typeface="Gill Sans MT" panose="020B0502020104020203" pitchFamily="34" charset="0"/>
+              </a:rPr>
+              <a:t>M</a:t>
+            </a:r>
+            <a:r>
+              <a:rPr lang="zh-CN" altLang="en-US" sz="1800" dirty="0">
+                <a:highlight>
+                  <a:srgbClr val="FFFF00"/>
+                </a:highlight>
+                <a:latin typeface="Gill Sans MT" panose="020B0502020104020203" pitchFamily="34" charset="0"/>
+              </a:rPr>
+              <a:t>ap</a:t>
+            </a:r>
+            <a:r>
+              <a:rPr lang="en-US" altLang="zh-CN" sz="1800" dirty="0">
+                <a:highlight>
+                  <a:srgbClr val="FFFF00"/>
+                </a:highlight>
+                <a:latin typeface="Gill Sans MT" panose="020B0502020104020203" pitchFamily="34" charset="0"/>
+              </a:rPr>
+              <a:t>(MSE)</a:t>
+            </a:r>
+            <a:r>
+              <a:rPr lang="zh-CN" altLang="en-US" sz="1800" dirty="0">
+                <a:highlight>
+                  <a:srgbClr val="FFFF00"/>
+                </a:highlight>
+                <a:latin typeface="Gill Sans MT" panose="020B0502020104020203" pitchFamily="34" charset="0"/>
+              </a:rPr>
+              <a:t>：</a:t>
+            </a:r>
+            <a:r>
+              <a:rPr lang="zh-CN" altLang="en-US" sz="1800" dirty="0">
+                <a:latin typeface="Gill Sans MT" panose="020B0502020104020203" pitchFamily="34" charset="0"/>
+              </a:rPr>
+              <a:t>存储公共子表达式候选集，遍历 </a:t>
+            </a:r>
+            <a:r>
+              <a:rPr lang="en-US" altLang="zh-CN" sz="1800" dirty="0">
+                <a:latin typeface="Gill Sans MT" panose="020B0502020104020203" pitchFamily="34" charset="0"/>
+              </a:rPr>
+              <a:t>Set(Reverse)</a:t>
+            </a:r>
+            <a:r>
+              <a:rPr lang="zh-CN" altLang="en-US" sz="1800" dirty="0">
+                <a:latin typeface="Gill Sans MT" panose="020B0502020104020203" pitchFamily="34" charset="0"/>
+              </a:rPr>
+              <a:t> 时，可以从候选集 </a:t>
+            </a:r>
+            <a:r>
+              <a:rPr lang="en-US" altLang="zh-CN" sz="1800" dirty="0">
+                <a:latin typeface="Gill Sans MT" panose="020B0502020104020203" pitchFamily="34" charset="0"/>
+              </a:rPr>
+              <a:t>M</a:t>
+            </a:r>
+            <a:r>
+              <a:rPr lang="zh-CN" altLang="en-US" sz="1800" dirty="0">
+                <a:latin typeface="Gill Sans MT" panose="020B0502020104020203" pitchFamily="34" charset="0"/>
+              </a:rPr>
+              <a:t>ap</a:t>
+            </a:r>
+            <a:r>
+              <a:rPr lang="en-US" altLang="zh-CN" sz="1800" dirty="0">
+                <a:latin typeface="Gill Sans MT" panose="020B0502020104020203" pitchFamily="34" charset="0"/>
+              </a:rPr>
+              <a:t>(MSE)</a:t>
+            </a:r>
+            <a:r>
+              <a:rPr lang="zh-CN" altLang="en-US" sz="1800" dirty="0">
+                <a:latin typeface="Gill Sans MT" panose="020B0502020104020203" pitchFamily="34" charset="0"/>
+              </a:rPr>
+              <a:t> 中查找是否有可以使用的表达式。</a:t>
+            </a:r>
+          </a:p>
+          <a:p>
+            <a:pPr marL="457200" indent="-457200" eaLnBrk="1" latinLnBrk="1" hangingPunct="1">
+              <a:lnSpc>
+                <a:spcPct val="150000"/>
+              </a:lnSpc>
+              <a:buFont typeface="+mj-lt"/>
+              <a:buAutoNum type="arabicPeriod"/>
+            </a:pPr>
+            <a:r>
+              <a:rPr lang="zh-CN" altLang="en-US" sz="1800" dirty="0">
+                <a:highlight>
+                  <a:srgbClr val="FFFF00"/>
+                </a:highlight>
+                <a:latin typeface="Gill Sans MT" panose="020B0502020104020203" pitchFamily="34" charset="0"/>
+              </a:rPr>
+              <a:t>遍历计算图的所有节点，判断是否有公共子表达式</a:t>
+            </a:r>
+            <a:r>
+              <a:rPr lang="zh-CN" altLang="en-US" sz="1800" dirty="0">
+                <a:latin typeface="Gill Sans MT" panose="020B0502020104020203" pitchFamily="34" charset="0"/>
+              </a:rPr>
+              <a:t>：获取节点 hash 值，hash的 key 由输出个数 + 输出类型s + 输入节点 id，key 可以保证输入相同及输出个数和类型相同时，得到的hash值相同，达到检索公共表达式的目的。</a:t>
+            </a:r>
+          </a:p>
+          <a:p>
+            <a:pPr marL="457200" indent="-457200" eaLnBrk="1" latinLnBrk="1" hangingPunct="1">
+              <a:lnSpc>
+                <a:spcPct val="150000"/>
+              </a:lnSpc>
+              <a:buFont typeface="+mj-lt"/>
+              <a:buAutoNum type="arabicPeriod"/>
+            </a:pPr>
+            <a:r>
+              <a:rPr lang="zh-CN" altLang="en-US" sz="1800" dirty="0">
+                <a:highlight>
+                  <a:srgbClr val="FFFF00"/>
+                </a:highlight>
+                <a:latin typeface="Gill Sans MT" panose="020B0502020104020203" pitchFamily="34" charset="0"/>
+              </a:rPr>
+              <a:t>记录入候选集：</a:t>
+            </a:r>
+            <a:r>
+              <a:rPr lang="zh-CN" altLang="en-US" sz="1800" dirty="0">
+                <a:latin typeface="Gill Sans MT" panose="020B0502020104020203" pitchFamily="34" charset="0"/>
+              </a:rPr>
+              <a:t>根据 hash 值 h 从 </a:t>
+            </a:r>
+            <a:r>
+              <a:rPr lang="en-US" altLang="zh-CN" sz="1800" dirty="0">
+                <a:latin typeface="Gill Sans MT" panose="020B0502020104020203" pitchFamily="34" charset="0"/>
+              </a:rPr>
+              <a:t>M</a:t>
+            </a:r>
+            <a:r>
+              <a:rPr lang="zh-CN" altLang="en-US" sz="1800" dirty="0">
+                <a:latin typeface="Gill Sans MT" panose="020B0502020104020203" pitchFamily="34" charset="0"/>
+              </a:rPr>
+              <a:t>ap</a:t>
+            </a:r>
+            <a:r>
+              <a:rPr lang="en-US" altLang="zh-CN" sz="1800" dirty="0">
+                <a:latin typeface="Gill Sans MT" panose="020B0502020104020203" pitchFamily="34" charset="0"/>
+              </a:rPr>
+              <a:t>(MSE)</a:t>
+            </a:r>
+            <a:r>
+              <a:rPr lang="zh-CN" altLang="en-US" sz="1800" dirty="0">
+                <a:latin typeface="Gill Sans MT" panose="020B0502020104020203" pitchFamily="34" charset="0"/>
+              </a:rPr>
+              <a:t> 中得到候选集，当候选集为空，第一次遇到这样的表达式，将节点 </a:t>
+            </a:r>
+            <a:r>
+              <a:rPr lang="en-US" altLang="zh-CN" sz="1800" dirty="0">
+                <a:latin typeface="Gill Sans MT" panose="020B0502020104020203" pitchFamily="34" charset="0"/>
+              </a:rPr>
+              <a:t>Node</a:t>
+            </a:r>
+            <a:r>
+              <a:rPr lang="zh-CN" altLang="en-US" sz="1800" dirty="0">
+                <a:latin typeface="Gill Sans MT" panose="020B0502020104020203" pitchFamily="34" charset="0"/>
+              </a:rPr>
+              <a:t> 存入 </a:t>
+            </a:r>
+            <a:r>
+              <a:rPr lang="en-US" altLang="zh-CN" sz="1800" dirty="0">
+                <a:latin typeface="Gill Sans MT" panose="020B0502020104020203" pitchFamily="34" charset="0"/>
+              </a:rPr>
+              <a:t>M</a:t>
+            </a:r>
+            <a:r>
+              <a:rPr lang="zh-CN" altLang="en-US" sz="1800" dirty="0">
+                <a:latin typeface="Gill Sans MT" panose="020B0502020104020203" pitchFamily="34" charset="0"/>
+              </a:rPr>
+              <a:t>ap</a:t>
+            </a:r>
+            <a:r>
+              <a:rPr lang="en-US" altLang="zh-CN" sz="1800" dirty="0">
+                <a:latin typeface="Gill Sans MT" panose="020B0502020104020203" pitchFamily="34" charset="0"/>
+              </a:rPr>
+              <a:t>(MSE)</a:t>
+            </a:r>
+            <a:r>
+              <a:rPr lang="zh-CN" altLang="en-US" sz="1800" dirty="0">
+                <a:latin typeface="Gill Sans MT" panose="020B0502020104020203" pitchFamily="34" charset="0"/>
+              </a:rPr>
+              <a:t> 中。</a:t>
+            </a:r>
+          </a:p>
+        </p:txBody>
+      </p:sp>
+    </p:spTree>
+    <p:extLst>
+      <p:ext uri="{BB962C8B-B14F-4D97-AF65-F5344CB8AC3E}">
+        <p14:creationId xmlns:p14="http://schemas.microsoft.com/office/powerpoint/2010/main" val="2771502772"/>
+      </p:ext>
+    </p:extLst>
+  </p:cSld>
+  <p:clrMapOvr>
+    <a:masterClrMapping/>
+  </p:clrMapOvr>
+  <mc:AlternateContent xmlns:mc="http://schemas.openxmlformats.org/markup-compatibility/2006" xmlns:p159="http://schemas.microsoft.com/office/powerpoint/2015/09/main">
+    <mc:Choice Requires="p159">
+      <p:transition xmlns:p14="http://schemas.microsoft.com/office/powerpoint/2010/main" spd="slow" p14:dur="2000" advClick="0">
+        <p159:morph option="byObject"/>
+      </p:transition>
+    </mc:Choice>
+    <mc:Fallback xmlns="">
+      <p:transition spd="slow" advClick="0">
+        <p:fade/>
+      </p:transition>
+    </mc:Fallback>
+  </mc:AlternateContent>
+</p:sld>
+</file>
+
+<file path=ppt/slides/slide17.xml><?xml version="1.0" encoding="utf-8"?>
+<p:sld xmlns:a="http://schemas.openxmlformats.org/drawingml/2006/main" xmlns:r="http://schemas.openxmlformats.org/officeDocument/2006/relationships" xmlns:p="http://schemas.openxmlformats.org/presentationml/2006/main">
+  <p:cSld>
+    <p:spTree>
+      <p:nvGrpSpPr>
+        <p:cNvPr id="1" name=""/>
+        <p:cNvGrpSpPr/>
+        <p:nvPr/>
+      </p:nvGrpSpPr>
+      <p:grpSpPr>
+        <a:xfrm>
+          <a:off x="0" y="0"/>
+          <a:ext cx="0" cy="0"/>
+          <a:chOff x="0" y="0"/>
+          <a:chExt cx="0" cy="0"/>
+        </a:xfrm>
+      </p:grpSpPr>
+      <p:sp>
+        <p:nvSpPr>
+          <p:cNvPr id="4" name="标题 3">
+            <a:extLst>
+              <a:ext uri="{FF2B5EF4-FFF2-40B4-BE49-F238E27FC236}">
+                <a16:creationId xmlns:a16="http://schemas.microsoft.com/office/drawing/2014/main" id="{7BD9286B-F655-604C-BA14-712B46499FC3}"/>
+              </a:ext>
+            </a:extLst>
+          </p:cNvPr>
+          <p:cNvSpPr>
+            <a:spLocks noGrp="1"/>
+          </p:cNvSpPr>
+          <p:nvPr>
+            <p:ph type="title"/>
+          </p:nvPr>
+        </p:nvSpPr>
+        <p:spPr/>
+        <p:txBody>
+          <a:bodyPr/>
+          <a:lstStyle/>
+          <a:p>
+            <a:r>
+              <a:rPr kumimoji="1" lang="en-US" altLang="zh-CN" dirty="0"/>
+              <a:t>Algorithm</a:t>
+            </a:r>
+            <a:endParaRPr lang="zh-CN" altLang="en-US" dirty="0"/>
+          </a:p>
+        </p:txBody>
+      </p:sp>
+      <p:sp>
+        <p:nvSpPr>
+          <p:cNvPr id="5" name="内容占位符 4">
+            <a:extLst>
+              <a:ext uri="{FF2B5EF4-FFF2-40B4-BE49-F238E27FC236}">
+                <a16:creationId xmlns:a16="http://schemas.microsoft.com/office/drawing/2014/main" id="{775DB1BA-EEC2-E84B-8AB9-E616BBF61F3F}"/>
+              </a:ext>
+            </a:extLst>
+          </p:cNvPr>
+          <p:cNvSpPr>
+            <a:spLocks noGrp="1"/>
+          </p:cNvSpPr>
+          <p:nvPr>
+            <p:ph sz="half" idx="1"/>
+          </p:nvPr>
+        </p:nvSpPr>
+        <p:spPr/>
+        <p:txBody>
+          <a:bodyPr/>
+          <a:lstStyle/>
+          <a:p>
+            <a:pPr marL="457200" indent="-457200" eaLnBrk="1" latinLnBrk="1" hangingPunct="1">
+              <a:lnSpc>
+                <a:spcPct val="150000"/>
+              </a:lnSpc>
+              <a:buFont typeface="+mj-lt"/>
+              <a:buAutoNum type="arabicPeriod" startAt="5"/>
+            </a:pPr>
+            <a:r>
+              <a:rPr lang="zh-CN" altLang="en-US" sz="1800" dirty="0">
+                <a:highlight>
+                  <a:srgbClr val="FFFF00"/>
+                </a:highlight>
+                <a:latin typeface="Gill Sans MT" panose="020B0502020104020203" pitchFamily="34" charset="0"/>
+              </a:rPr>
+              <a:t>可复用公共子表达式判断</a:t>
+            </a:r>
+            <a:r>
+              <a:rPr lang="zh-CN" altLang="en-US" sz="1600" dirty="0">
+                <a:latin typeface="Gill Sans MT" panose="020B0502020104020203" pitchFamily="34" charset="0"/>
+              </a:rPr>
+              <a:t>：</a:t>
+            </a:r>
+            <a:r>
+              <a:rPr lang="en-US" altLang="zh-CN" sz="1600" dirty="0">
+                <a:latin typeface="Gill Sans MT" panose="020B0502020104020203" pitchFamily="34" charset="0"/>
+              </a:rPr>
+              <a:t>C</a:t>
+            </a:r>
+            <a:r>
+              <a:rPr lang="zh-CN" altLang="en-US" sz="1800" dirty="0">
+                <a:latin typeface="Gill Sans MT" panose="020B0502020104020203" pitchFamily="34" charset="0"/>
+              </a:rPr>
+              <a:t>andidate 非空，则说明之前遍历到了相似的表达式，进一步判断是否可复用已保存节点表达式的结果。即节点的输入都是来自相同的</a:t>
+            </a:r>
+            <a:r>
+              <a:rPr lang="en-US" altLang="zh-CN" sz="1800" dirty="0">
+                <a:latin typeface="Gill Sans MT" panose="020B0502020104020203" pitchFamily="34" charset="0"/>
+              </a:rPr>
+              <a:t>C</a:t>
+            </a:r>
+            <a:r>
+              <a:rPr lang="zh-CN" altLang="en-US" sz="1800" dirty="0">
+                <a:latin typeface="Gill Sans MT" panose="020B0502020104020203" pitchFamily="34" charset="0"/>
+              </a:rPr>
+              <a:t>onst节点，可以保证输入数据完全相同；输出个数和类型相同，可以保证输出的结果相同；满足条件下，可复用之前保存节点的结果，不用再次进行计算。</a:t>
+            </a:r>
+          </a:p>
+          <a:p>
+            <a:pPr marL="457200" indent="-457200" eaLnBrk="1" latinLnBrk="1" hangingPunct="1">
+              <a:lnSpc>
+                <a:spcPct val="150000"/>
+              </a:lnSpc>
+              <a:buFont typeface="+mj-lt"/>
+              <a:buAutoNum type="arabicPeriod" startAt="5"/>
+            </a:pPr>
+            <a:r>
+              <a:rPr lang="zh-CN" altLang="en-US" sz="1800" dirty="0">
+                <a:highlight>
+                  <a:srgbClr val="FFFF00"/>
+                </a:highlight>
+                <a:latin typeface="Gill Sans MT" panose="020B0502020104020203" pitchFamily="34" charset="0"/>
+              </a:rPr>
+              <a:t>删除重复节点：</a:t>
+            </a:r>
+            <a:r>
+              <a:rPr lang="zh-CN" altLang="en-US" sz="1800" dirty="0">
+                <a:latin typeface="Gill Sans MT" panose="020B0502020104020203" pitchFamily="34" charset="0"/>
+              </a:rPr>
+              <a:t>判断表达式可以复用后，最后一步就是删除重复的节点，将 </a:t>
+            </a:r>
+            <a:r>
+              <a:rPr lang="en-US" altLang="zh-CN" sz="1800" dirty="0">
+                <a:latin typeface="Gill Sans MT" panose="020B0502020104020203" pitchFamily="34" charset="0"/>
+              </a:rPr>
+              <a:t>C</a:t>
+            </a:r>
+            <a:r>
+              <a:rPr lang="zh-CN" altLang="en-US" sz="1800" dirty="0">
+                <a:latin typeface="Gill Sans MT" panose="020B0502020104020203" pitchFamily="34" charset="0"/>
+              </a:rPr>
+              <a:t>andidate 的输出连接到当前节点的输出节点对应的输入，最后删除当前节点。</a:t>
+            </a:r>
+          </a:p>
+        </p:txBody>
+      </p:sp>
+    </p:spTree>
+    <p:extLst>
+      <p:ext uri="{BB962C8B-B14F-4D97-AF65-F5344CB8AC3E}">
+        <p14:creationId xmlns:p14="http://schemas.microsoft.com/office/powerpoint/2010/main" val="2966272078"/>
+      </p:ext>
+    </p:extLst>
+  </p:cSld>
+  <p:clrMapOvr>
+    <a:masterClrMapping/>
+  </p:clrMapOvr>
+  <mc:AlternateContent xmlns:mc="http://schemas.openxmlformats.org/markup-compatibility/2006" xmlns:p159="http://schemas.microsoft.com/office/powerpoint/2015/09/main">
+    <mc:Choice Requires="p159">
+      <p:transition xmlns:p14="http://schemas.microsoft.com/office/powerpoint/2010/main" spd="slow" p14:dur="2000" advClick="0">
+        <p159:morph option="byObject"/>
+      </p:transition>
+    </mc:Choice>
+    <mc:Fallback xmlns="">
+      <p:transition spd="slow" advClick="0">
+        <p:fade/>
+      </p:transition>
+    </mc:Fallback>
+  </mc:AlternateContent>
+</p:sld>
+</file>
+
+<file path=ppt/slides/slide18.xml><?xml version="1.0" encoding="utf-8"?>
+<p:sld xmlns:a="http://schemas.openxmlformats.org/drawingml/2006/main" xmlns:r="http://schemas.openxmlformats.org/officeDocument/2006/relationships" xmlns:p="http://schemas.openxmlformats.org/presentationml/2006/main">
+  <p:cSld>
+    <p:spTree>
+      <p:nvGrpSpPr>
+        <p:cNvPr id="1" name=""/>
+        <p:cNvGrpSpPr/>
+        <p:nvPr/>
+      </p:nvGrpSpPr>
+      <p:grpSpPr>
+        <a:xfrm>
+          <a:off x="0" y="0"/>
+          <a:ext cx="0" cy="0"/>
+          <a:chOff x="0" y="0"/>
+          <a:chExt cx="0" cy="0"/>
+        </a:xfrm>
+      </p:grpSpPr>
+      <p:sp>
+        <p:nvSpPr>
+          <p:cNvPr id="2" name="标题 1">
+            <a:extLst>
+              <a:ext uri="{FF2B5EF4-FFF2-40B4-BE49-F238E27FC236}">
+                <a16:creationId xmlns:a16="http://schemas.microsoft.com/office/drawing/2014/main" id="{7BB696E5-12D9-1645-986E-3F2230DDAB58}"/>
+              </a:ext>
+            </a:extLst>
+          </p:cNvPr>
+          <p:cNvSpPr>
+            <a:spLocks noGrp="1"/>
+          </p:cNvSpPr>
+          <p:nvPr>
+            <p:ph type="title"/>
+          </p:nvPr>
+        </p:nvSpPr>
+        <p:spPr/>
+        <p:txBody>
+          <a:bodyPr/>
+          <a:lstStyle/>
+          <a:p>
+            <a:r>
+              <a:rPr kumimoji="1" lang="en-US" altLang="zh-CN" dirty="0"/>
+              <a:t>Reference</a:t>
+            </a:r>
+            <a:endParaRPr kumimoji="1" lang="zh-CN" altLang="en-US" dirty="0"/>
+          </a:p>
+        </p:txBody>
+      </p:sp>
+      <p:sp>
+        <p:nvSpPr>
+          <p:cNvPr id="3" name="内容占位符 2">
+            <a:extLst>
+              <a:ext uri="{FF2B5EF4-FFF2-40B4-BE49-F238E27FC236}">
+                <a16:creationId xmlns:a16="http://schemas.microsoft.com/office/drawing/2014/main" id="{7AFE82E5-A73A-6F43-8864-9BEA47F5F0CD}"/>
+              </a:ext>
+            </a:extLst>
+          </p:cNvPr>
+          <p:cNvSpPr>
+            <a:spLocks noGrp="1"/>
+          </p:cNvSpPr>
+          <p:nvPr>
+            <p:ph sz="half" idx="1"/>
+          </p:nvPr>
+        </p:nvSpPr>
+        <p:spPr/>
+        <p:txBody>
+          <a:bodyPr/>
+          <a:lstStyle/>
+          <a:p>
+            <a:pPr>
+              <a:buFont typeface="+mj-lt"/>
+              <a:buAutoNum type="arabicPeriod"/>
+            </a:pPr>
+            <a:r>
+              <a:rPr lang="en-US" altLang="zh-CN" sz="1200" dirty="0">
+                <a:latin typeface="Gill Sans MT" panose="020B0502020104020203" pitchFamily="34" charset="0"/>
+              </a:rPr>
+              <a:t>Common Subexpression Elimination – Code optimization Technique in Compiler Design</a:t>
+            </a:r>
+            <a:r>
+              <a:rPr lang="zh-CN" altLang="en-US" sz="1200" dirty="0">
+                <a:latin typeface="Gill Sans MT" panose="020B0502020104020203" pitchFamily="34" charset="0"/>
+              </a:rPr>
+              <a:t> </a:t>
+            </a:r>
+            <a:r>
+              <a:rPr lang="en-US" altLang="zh-CN" sz="1200" dirty="0">
+                <a:latin typeface="Gill Sans MT" panose="020B0502020104020203" pitchFamily="34" charset="0"/>
+                <a:ea typeface="Microsoft YaHei" panose="020B0503020204020204" pitchFamily="34" charset="-122"/>
+                <a:hlinkClick r:id="rId2"/>
+              </a:rPr>
+              <a:t>https://www.geeksforgeeks.org/common-subexpression-elimination-code-optimization-technique-in-compiler-design/</a:t>
+            </a:r>
+            <a:endParaRPr lang="en-US" altLang="zh-CN" sz="1200" dirty="0">
+              <a:latin typeface="Gill Sans MT" panose="020B0502020104020203" pitchFamily="34" charset="0"/>
+              <a:ea typeface="Microsoft YaHei" panose="020B0503020204020204" pitchFamily="34" charset="-122"/>
+            </a:endParaRPr>
+          </a:p>
+          <a:p>
+            <a:pPr>
+              <a:buFont typeface="+mj-lt"/>
+              <a:buAutoNum type="arabicPeriod"/>
+            </a:pPr>
+            <a:r>
+              <a:rPr lang="en-US" altLang="zh-CN" sz="1200" dirty="0">
+                <a:latin typeface="Gill Sans MT" panose="020B0502020104020203" pitchFamily="34" charset="0"/>
+              </a:rPr>
+              <a:t>Steven Muchnick; Muchnick and Associates. . Morgan Kaufmann. 15 August 1997. </a:t>
+            </a:r>
+            <a:r>
+              <a:rPr lang="en-US" altLang="zh-CN" sz="1200" dirty="0">
+                <a:latin typeface="Gill Sans MT" panose="020B0502020104020203" pitchFamily="34" charset="0"/>
+                <a:hlinkClick r:id="rId3" tooltip="Special:网络书源/978-1-55860-320-2"/>
+              </a:rPr>
+              <a:t>ISBN 978-1-55860-320-2</a:t>
+            </a:r>
+            <a:r>
+              <a:rPr lang="en-US" altLang="zh-CN" sz="1200" dirty="0">
+                <a:latin typeface="Gill Sans MT" panose="020B0502020104020203" pitchFamily="34" charset="0"/>
+              </a:rPr>
+              <a:t>. Common subexpression elimination.</a:t>
+            </a:r>
+          </a:p>
+          <a:p>
+            <a:pPr>
+              <a:buFont typeface="+mj-lt"/>
+              <a:buAutoNum type="arabicPeriod"/>
+            </a:pPr>
+            <a:r>
+              <a:rPr lang="en-US" altLang="zh-CN" sz="1200" dirty="0">
+                <a:latin typeface="Gill Sans MT" panose="020B0502020104020203" pitchFamily="34" charset="0"/>
+                <a:ea typeface="Microsoft YaHei" panose="020B0503020204020204" pitchFamily="34" charset="-122"/>
+                <a:hlinkClick r:id="rId4"/>
+              </a:rPr>
+              <a:t>https://www.tensorflow.org/jvm/api_docs/java/org/tensorflow/proto/framework/OptimizerOptions.Builder</a:t>
+            </a:r>
+            <a:endParaRPr lang="en-US" altLang="zh-CN" sz="1200" dirty="0">
+              <a:latin typeface="Gill Sans MT" panose="020B0502020104020203" pitchFamily="34" charset="0"/>
+              <a:ea typeface="Microsoft YaHei" panose="020B0503020204020204" pitchFamily="34" charset="-122"/>
+            </a:endParaRPr>
+          </a:p>
+          <a:p>
+            <a:pPr>
+              <a:buFont typeface="+mj-lt"/>
+              <a:buAutoNum type="arabicPeriod"/>
+            </a:pPr>
+            <a:r>
+              <a:rPr lang="en-US" altLang="zh-CN" sz="1200" dirty="0">
+                <a:latin typeface="Gill Sans MT" panose="020B0502020104020203" pitchFamily="34" charset="0"/>
+                <a:ea typeface="Microsoft YaHei" panose="020B0503020204020204" pitchFamily="34" charset="-122"/>
+                <a:hlinkClick r:id="rId5"/>
+              </a:rPr>
+              <a:t>https://en.wikipedia.org/wiki/Common_subexpression_elimination</a:t>
+            </a:r>
+            <a:endParaRPr lang="en-US" altLang="zh-CN" sz="1200" dirty="0">
+              <a:latin typeface="Gill Sans MT" panose="020B0502020104020203" pitchFamily="34" charset="0"/>
+              <a:ea typeface="Microsoft YaHei" panose="020B0503020204020204" pitchFamily="34" charset="-122"/>
+            </a:endParaRPr>
+          </a:p>
+        </p:txBody>
+      </p:sp>
+    </p:spTree>
+    <p:extLst>
+      <p:ext uri="{BB962C8B-B14F-4D97-AF65-F5344CB8AC3E}">
+        <p14:creationId xmlns:p14="http://schemas.microsoft.com/office/powerpoint/2010/main" val="843830938"/>
+      </p:ext>
+    </p:extLst>
+  </p:cSld>
+  <p:clrMapOvr>
+    <a:masterClrMapping/>
+  </p:clrMapOvr>
+  <mc:AlternateContent xmlns:mc="http://schemas.openxmlformats.org/markup-compatibility/2006" xmlns:p159="http://schemas.microsoft.com/office/powerpoint/2015/09/main">
+    <mc:Choice Requires="p159">
+      <p:transition spd="slow" advClick="0">
+        <p159:morph option="byObject"/>
+      </p:transition>
+    </mc:Choice>
+    <mc:Fallback xmlns="">
+      <p:transition spd="slow" advClick="0">
+        <p:fade/>
+      </p:transition>
+    </mc:Fallback>
+  </mc:AlternateContent>
+</p:sld>
+</file>
+
+<file path=ppt/slides/slide19.xml><?xml version="1.0" encoding="utf-8"?>
+<p:sld xmlns:a="http://schemas.openxmlformats.org/drawingml/2006/main" xmlns:r="http://schemas.openxmlformats.org/officeDocument/2006/relationships" xmlns:p="http://schemas.openxmlformats.org/presentationml/2006/main">
+  <p:cSld>
+    <p:spTree>
+      <p:nvGrpSpPr>
+        <p:cNvPr id="1" name=""/>
+        <p:cNvGrpSpPr/>
+        <p:nvPr/>
+      </p:nvGrpSpPr>
+      <p:grpSpPr>
+        <a:xfrm>
+          <a:off x="0" y="0"/>
+          <a:ext cx="0" cy="0"/>
+          <a:chOff x="0" y="0"/>
+          <a:chExt cx="0" cy="0"/>
+        </a:xfrm>
+      </p:grpSpPr>
+    </p:spTree>
+    <p:extLst>
+      <p:ext uri="{BB962C8B-B14F-4D97-AF65-F5344CB8AC3E}">
+        <p14:creationId xmlns:p14="http://schemas.microsoft.com/office/powerpoint/2010/main" val="2327015185"/>
+      </p:ext>
+    </p:extLst>
+  </p:cSld>
+  <p:clrMapOvr>
+    <a:masterClrMapping/>
+  </p:clrMapOvr>
+  <mc:AlternateContent xmlns:mc="http://schemas.openxmlformats.org/markup-compatibility/2006" xmlns:p159="http://schemas.microsoft.com/office/powerpoint/2015/09/main">
+    <mc:Choice Requires="p159">
+      <p:transition spd="slow" advClick="0">
+        <p159:morph option="byObject"/>
+      </p:transition>
+    </mc:Choice>
+    <mc:Fallback xmlns="">
+      <p:transition spd="slow" advClick="0">
+        <p:fade/>
+      </p:transition>
+    </mc:Fallback>
+  </mc:AlternateContent>
+</p:sld>
+</file>
+
 <file path=ppt/slides/slide2.xml><?xml version="1.0" encoding="utf-8"?>
 <p:sld xmlns:a="http://schemas.openxmlformats.org/drawingml/2006/main" xmlns:r="http://schemas.openxmlformats.org/officeDocument/2006/relationships" xmlns:p="http://schemas.openxmlformats.org/presentationml/2006/main">
   <p:cSld>
@@ -40184,7 +42875,7 @@
                 </a:solidFill>
                 <a:latin typeface="Gill Sans MT" panose="020B0502020104020203" pitchFamily="34" charset="0"/>
               </a:rPr>
-              <a:t>Constant</a:t>
+              <a:t>Common Subexpression Elimination – </a:t>
             </a:r>
             <a:r>
               <a:rPr lang="zh-CN" altLang="en-US" sz="2800" b="1" dirty="0">
@@ -40193,43 +42884,7 @@
                 </a:solidFill>
                 <a:latin typeface="Gill Sans MT" panose="020B0502020104020203" pitchFamily="34" charset="0"/>
               </a:rPr>
-              <a:t> </a:t>
-            </a:r>
-            <a:r>
-              <a:rPr lang="en-US" altLang="zh-CN" sz="2800" b="1" dirty="0">
-                <a:solidFill>
-                  <a:srgbClr val="374154"/>
-                </a:solidFill>
-                <a:latin typeface="Gill Sans MT" panose="020B0502020104020203" pitchFamily="34" charset="0"/>
-              </a:rPr>
-              <a:t>Fold</a:t>
-            </a:r>
-            <a:r>
-              <a:rPr lang="zh-CN" altLang="en-US" sz="2800" b="1" dirty="0">
-                <a:solidFill>
-                  <a:srgbClr val="374154"/>
-                </a:solidFill>
-                <a:latin typeface="Gill Sans MT" panose="020B0502020104020203" pitchFamily="34" charset="0"/>
-              </a:rPr>
-              <a:t> </a:t>
-            </a:r>
-            <a:r>
-              <a:rPr lang="en-US" altLang="zh-CN" sz="2800" b="1" dirty="0">
-                <a:solidFill>
-                  <a:srgbClr val="374154"/>
-                </a:solidFill>
-                <a:latin typeface="Gill Sans MT" panose="020B0502020104020203" pitchFamily="34" charset="0"/>
-              </a:rPr>
-              <a:t>–</a:t>
-            </a:r>
-            <a:r>
-              <a:rPr lang="zh-CN" altLang="en-US" sz="2800" b="1" dirty="0">
-                <a:solidFill>
-                  <a:srgbClr val="374154"/>
-                </a:solidFill>
-                <a:latin typeface="Gill Sans MT" panose="020B0502020104020203" pitchFamily="34" charset="0"/>
-              </a:rPr>
-              <a:t> 常量折叠</a:t>
+              <a:t>公共子表达式消除 </a:t>
             </a:r>
             <a:endParaRPr lang="en-US" altLang="zh-CN" sz="2800" b="1" dirty="0">
               <a:solidFill>
@@ -40241,13 +42896,22 @@
           <a:p>
             <a:pPr lvl="1"/>
             <a:r>
+              <a:rPr lang="en-US" altLang="zh-CN" sz="2400" dirty="0">
+                <a:solidFill>
+                  <a:srgbClr val="374154"/>
+                </a:solidFill>
+                <a:latin typeface="Gill Sans MT" panose="020B0502020104020203" pitchFamily="34" charset="0"/>
+              </a:rPr>
+              <a:t>CSE</a:t>
+            </a:r>
+            <a:r>
               <a:rPr lang="zh-CN" altLang="en-US" sz="2400" dirty="0">
                 <a:solidFill>
                   <a:srgbClr val="374154"/>
                 </a:solidFill>
                 <a:latin typeface="Gill Sans MT" panose="020B0502020104020203" pitchFamily="34" charset="0"/>
               </a:rPr>
-              <a:t>传统编译器中的概念</a:t>
+              <a:t>的概念定义</a:t>
             </a:r>
             <a:endParaRPr lang="en-US" altLang="zh-CN" sz="2400" dirty="0">
               <a:solidFill>
@@ -40274,14 +42938,17 @@
                 </a:solidFill>
                 <a:latin typeface="Gill Sans MT" panose="020B0502020104020203" pitchFamily="34" charset="0"/>
               </a:rPr>
-              <a:t>编译器中的常量折叠</a:t>
-            </a:r>
-            <a:endParaRPr lang="en-US" altLang="zh-CN" sz="2400" dirty="0">
-              <a:solidFill>
-                <a:srgbClr val="374154"/>
-              </a:solidFill>
-              <a:latin typeface="Gill Sans MT" panose="020B0502020104020203" pitchFamily="34" charset="0"/>
-            </a:endParaRPr>
+              <a:t>编译器中的</a:t>
+            </a:r>
+            <a:r>
+              <a:rPr lang="en-US" altLang="zh-CN" sz="2400" dirty="0">
+                <a:solidFill>
+                  <a:srgbClr val="374154"/>
+                </a:solidFill>
+                <a:latin typeface="Gill Sans MT" panose="020B0502020104020203" pitchFamily="34" charset="0"/>
+              </a:rPr>
+              <a:t>CSE</a:t>
+            </a:r>
           </a:p>
         </p:txBody>
       </p:sp>
@@ -40465,7 +43132,7 @@
                 <a:latin typeface="Futura Medium" panose="020B0602020204020303" pitchFamily="34" charset="-79"/>
                 <a:cs typeface="Futura Medium" panose="020B0602020204020303" pitchFamily="34" charset="-79"/>
               </a:rPr>
-              <a:t>常量折叠与</a:t>
+              <a:t>公共子表达式消除</a:t>
             </a:r>
             <a:endParaRPr lang="en-US" altLang="zh-CN" sz="9600" dirty="0">
               <a:solidFill>
@@ -40487,7 +43154,7 @@
                 <a:latin typeface="Futura Medium" panose="020B0602020204020303" pitchFamily="34" charset="-79"/>
                 <a:cs typeface="Futura Medium" panose="020B0602020204020303" pitchFamily="34" charset="-79"/>
               </a:rPr>
-              <a:t>常量传播</a:t>
+              <a:t>概念定义</a:t>
             </a:r>
           </a:p>
         </p:txBody>
@@ -40536,10 +43203,10 @@
       </p:grpSpPr>
       <p:sp>
         <p:nvSpPr>
-          <p:cNvPr id="2" name="标题 1">
+          <p:cNvPr id="4" name="标题 3">
             <a:extLst>
               <a:ext uri="{FF2B5EF4-FFF2-40B4-BE49-F238E27FC236}">
-                <a16:creationId xmlns:a16="http://schemas.microsoft.com/office/drawing/2014/main" id="{7BB696E5-12D9-1645-986E-3F2230DDAB58}"/>
+                <a16:creationId xmlns:a16="http://schemas.microsoft.com/office/drawing/2014/main" id="{3F070C18-AB22-C349-AD6A-57985058D4A3}"/>
               </a:ext>
             </a:extLst>
           </p:cNvPr>
@@ -40556,19 +43223,18 @@
           <a:lstStyle/>
           <a:p>
             <a:r>
-              <a:rPr kumimoji="1" lang="en-US" altLang="zh-CN" dirty="0"/>
-              <a:t>Reference</a:t>
-            </a:r>
-            <a:endParaRPr kumimoji="1" lang="zh-CN" altLang="en-US" dirty="0"/>
+              <a:rPr lang="zh-CN" altLang="en-US" dirty="0"/>
+              <a:t>公共子表达式消除</a:t>
+            </a:r>
           </a:p>
         </p:txBody>
       </p:sp>
       <p:sp>
         <p:nvSpPr>
-          <p:cNvPr id="3" name="内容占位符 2">
+          <p:cNvPr id="5" name="内容占位符 4">
             <a:extLst>
               <a:ext uri="{FF2B5EF4-FFF2-40B4-BE49-F238E27FC236}">
-                <a16:creationId xmlns:a16="http://schemas.microsoft.com/office/drawing/2014/main" id="{7AFE82E5-A73A-6F43-8864-9BEA47F5F0CD}"/>
+                <a16:creationId xmlns:a16="http://schemas.microsoft.com/office/drawing/2014/main" id="{83D4EE28-12C0-A040-BFBF-E172397DF1D1}"/>
               </a:ext>
             </a:extLst>
           </p:cNvPr>
@@ -40584,121 +43250,78 @@
           <a:bodyPr/>
           <a:lstStyle/>
           <a:p>
-            <a:pPr latinLnBrk="1">
-              <a:buFont typeface="+mj-lt"/>
-              <a:buAutoNum type="arabicPeriod"/>
+            <a:pPr>
+              <a:lnSpc>
+                <a:spcPct val="150000"/>
+              </a:lnSpc>
             </a:pPr>
             <a:r>
-              <a:rPr lang="zh-CN" altLang="en-US" sz="1200" dirty="0">
+              <a:rPr lang="en-US" altLang="zh-CN" dirty="0">
                 <a:latin typeface="Gill Sans MT" panose="020B0502020104020203" pitchFamily="34" charset="0"/>
-                <a:ea typeface="Microsoft YaHei" panose="020B0503020204020204" pitchFamily="34" charset="-122"/>
-              </a:rPr>
-              <a:t>编译器优化 </a:t>
-            </a:r>
-            <a:r>
-              <a:rPr lang="en-US" altLang="zh-CN" sz="1200" dirty="0">
+              </a:rPr>
+              <a:t>CSE</a:t>
+            </a:r>
+            <a:r>
+              <a:rPr lang="zh-CN" altLang="en-US" dirty="0">
                 <a:latin typeface="Gill Sans MT" panose="020B0502020104020203" pitchFamily="34" charset="0"/>
-                <a:ea typeface="Microsoft YaHei" panose="020B0503020204020204" pitchFamily="34" charset="-122"/>
-              </a:rPr>
-              <a:t>-- </a:t>
-            </a:r>
-            <a:r>
-              <a:rPr lang="zh-CN" altLang="en-US" sz="1200" dirty="0">
+              </a:rPr>
+              <a:t>（</a:t>
+            </a:r>
+            <a:r>
+              <a:rPr lang="en-US" altLang="zh-CN" dirty="0">
                 <a:latin typeface="Gill Sans MT" panose="020B0502020104020203" pitchFamily="34" charset="0"/>
-                <a:ea typeface="Microsoft YaHei" panose="020B0503020204020204" pitchFamily="34" charset="-122"/>
-              </a:rPr>
-              <a:t>常量折叠</a:t>
-            </a:r>
-            <a:r>
-              <a:rPr lang="en-US" altLang="zh-CN" sz="1200" dirty="0">
+              </a:rPr>
+              <a:t>Common subexpression elimination</a:t>
+            </a:r>
+            <a:r>
+              <a:rPr lang="zh-CN" altLang="en-US" dirty="0">
                 <a:latin typeface="Gill Sans MT" panose="020B0502020104020203" pitchFamily="34" charset="0"/>
-                <a:ea typeface="Microsoft YaHei" panose="020B0503020204020204" pitchFamily="34" charset="-122"/>
-              </a:rPr>
-              <a:t> </a:t>
-            </a:r>
-            <a:r>
-              <a:rPr lang="en-US" altLang="zh-CN" sz="1200" dirty="0">
-                <a:latin typeface="Gill Sans MT" panose="020B0502020104020203" pitchFamily="34" charset="0"/>
-                <a:ea typeface="Microsoft YaHei" panose="020B0503020204020204" pitchFamily="34" charset="-122"/>
-                <a:hlinkClick r:id="rId2"/>
-              </a:rPr>
-              <a:t>https://blog.caoxudong.info/blog/2013/10/23/compiler_optimizations_constant_folding</a:t>
-            </a:r>
-            <a:endParaRPr lang="en-US" altLang="zh-CN" sz="1200" dirty="0">
-              <a:latin typeface="Gill Sans MT" panose="020B0502020104020203" pitchFamily="34" charset="0"/>
-              <a:ea typeface="Microsoft YaHei" panose="020B0503020204020204" pitchFamily="34" charset="-122"/>
-            </a:endParaRPr>
-          </a:p>
-          <a:p>
-            <a:pPr latinLnBrk="1">
-              <a:buFont typeface="+mj-lt"/>
-              <a:buAutoNum type="arabicPeriod"/>
-            </a:pPr>
-            <a:r>
-              <a:rPr lang="zh-CN" altLang="en-US" sz="1200" dirty="0">
-                <a:latin typeface="Gill Sans MT" panose="020B0502020104020203" pitchFamily="34" charset="0"/>
-                <a:ea typeface="Microsoft YaHei" panose="020B0503020204020204" pitchFamily="34" charset="-122"/>
-              </a:rPr>
-              <a:t>神经网络编译器</a:t>
-            </a:r>
-            <a:r>
-              <a:rPr lang="en-US" altLang="zh-CN" sz="1200" dirty="0">
-                <a:latin typeface="Gill Sans MT" panose="020B0502020104020203" pitchFamily="34" charset="0"/>
-                <a:ea typeface="Microsoft YaHei" panose="020B0503020204020204" pitchFamily="34" charset="-122"/>
-              </a:rPr>
-              <a:t>-</a:t>
-            </a:r>
-            <a:r>
-              <a:rPr lang="zh-CN" altLang="en-US" sz="1200" dirty="0">
-                <a:latin typeface="Gill Sans MT" panose="020B0502020104020203" pitchFamily="34" charset="0"/>
-                <a:ea typeface="Microsoft YaHei" panose="020B0503020204020204" pitchFamily="34" charset="-122"/>
-              </a:rPr>
-              <a:t>常量折叠</a:t>
-            </a:r>
-            <a:r>
-              <a:rPr lang="en-US" altLang="zh-CN" sz="1200" dirty="0">
-                <a:latin typeface="Gill Sans MT" panose="020B0502020104020203" pitchFamily="34" charset="0"/>
-                <a:ea typeface="Microsoft YaHei" panose="020B0503020204020204" pitchFamily="34" charset="-122"/>
-              </a:rPr>
-              <a:t> </a:t>
-            </a:r>
-            <a:r>
-              <a:rPr lang="en-US" altLang="zh-CN" sz="1200" dirty="0">
-                <a:latin typeface="Gill Sans MT" panose="020B0502020104020203" pitchFamily="34" charset="0"/>
-                <a:ea typeface="Microsoft YaHei" panose="020B0503020204020204" pitchFamily="34" charset="-122"/>
-                <a:hlinkClick r:id="rId3"/>
-              </a:rPr>
-              <a:t>https://blog.csdn.net/free1993/article/details/111480268</a:t>
-            </a:r>
-            <a:endParaRPr lang="en-US" altLang="zh-CN" sz="1200" dirty="0">
-              <a:latin typeface="Gill Sans MT" panose="020B0502020104020203" pitchFamily="34" charset="0"/>
-              <a:ea typeface="Microsoft YaHei" panose="020B0503020204020204" pitchFamily="34" charset="-122"/>
-            </a:endParaRPr>
-          </a:p>
-          <a:p>
-            <a:pPr>
-              <a:buFont typeface="+mj-lt"/>
-              <a:buAutoNum type="arabicPeriod"/>
-            </a:pPr>
-            <a:r>
-              <a:rPr lang="en-US" altLang="zh-CN" sz="1200" u="sng" dirty="0">
-                <a:latin typeface="Gill Sans MT" panose="020B0502020104020203" pitchFamily="34" charset="0"/>
-                <a:ea typeface="Microsoft YaHei" panose="020B0503020204020204" pitchFamily="34" charset="-122"/>
-                <a:hlinkClick r:id="rId4"/>
-              </a:rPr>
-              <a:t>https://en.wikipedia.org/wiki/Constant_folding</a:t>
-            </a:r>
-            <a:endParaRPr lang="en-US" altLang="zh-CN" sz="1200" dirty="0">
-              <a:latin typeface="Gill Sans MT" panose="020B0502020104020203" pitchFamily="34" charset="0"/>
-              <a:ea typeface="Microsoft YaHei" panose="020B0503020204020204" pitchFamily="34" charset="-122"/>
-            </a:endParaRPr>
+              </a:rPr>
+              <a:t>），是一个编译器优化技术。在执行这项优化的过程中，编译器会视情况将多个相同的表达式替换成一个变量，这个变量存储着计算该表达式后所得到的值。</a:t>
+            </a:r>
           </a:p>
         </p:txBody>
       </p:sp>
+      <p:pic>
+        <p:nvPicPr>
+          <p:cNvPr id="6" name="图片 5">
+            <a:extLst>
+              <a:ext uri="{FF2B5EF4-FFF2-40B4-BE49-F238E27FC236}">
+                <a16:creationId xmlns:a16="http://schemas.microsoft.com/office/drawing/2014/main" id="{59214FFE-CA35-4A4A-8770-66E859E36EE3}"/>
+              </a:ext>
+            </a:extLst>
+          </p:cNvPr>
+          <p:cNvPicPr>
+            <a:picLocks noChangeAspect="1"/>
+          </p:cNvPicPr>
+          <p:nvPr/>
+        </p:nvPicPr>
+        <p:blipFill>
+          <a:blip r:embed="rId2" cstate="screen">
+            <a:extLst>
+              <a:ext uri="{28A0092B-C50C-407E-A947-70E740481C1C}">
+                <a14:useLocalDpi xmlns:a14="http://schemas.microsoft.com/office/drawing/2010/main"/>
+              </a:ext>
+            </a:extLst>
+          </a:blip>
+          <a:stretch>
+            <a:fillRect/>
+          </a:stretch>
+        </p:blipFill>
+        <p:spPr>
+          <a:xfrm>
+            <a:off x="985813" y="3369788"/>
+            <a:ext cx="10225136" cy="1211340"/>
+          </a:xfrm>
+          <a:prstGeom prst="rect">
+            <a:avLst/>
+          </a:prstGeom>
+        </p:spPr>
+      </p:pic>
     </p:spTree>
     <p:extLst>
       <p:ext uri="{BB962C8B-B14F-4D97-AF65-F5344CB8AC3E}">
-        <p14:creationId xmlns:p14="http://schemas.microsoft.com/office/powerpoint/2010/main" val="843830938"/>
+        <p14:creationId xmlns:p14="http://schemas.microsoft.com/office/powerpoint/2010/main" val="3783352945"/>
       </p:ext>
     </p:extLst>
   </p:cSld>
@@ -40707,7 +43330,7 @@
   </p:clrMapOvr>
   <mc:AlternateContent xmlns:mc="http://schemas.openxmlformats.org/markup-compatibility/2006" xmlns:p159="http://schemas.microsoft.com/office/powerpoint/2015/09/main">
     <mc:Choice Requires="p159">
-      <p:transition spd="slow" advClick="0">
+      <p:transition xmlns:p14="http://schemas.microsoft.com/office/powerpoint/2010/main" spd="slow" p14:dur="2000" advClick="0">
         <p159:morph option="byObject"/>
       </p:transition>
     </mc:Choice>
@@ -40737,10 +43360,231 @@
           <a:chExt cx="0" cy="0"/>
         </a:xfrm>
       </p:grpSpPr>
+      <p:sp>
+        <p:nvSpPr>
+          <p:cNvPr id="4" name="标题 3">
+            <a:extLst>
+              <a:ext uri="{FF2B5EF4-FFF2-40B4-BE49-F238E27FC236}">
+                <a16:creationId xmlns:a16="http://schemas.microsoft.com/office/drawing/2014/main" id="{3F070C18-AB22-C349-AD6A-57985058D4A3}"/>
+              </a:ext>
+            </a:extLst>
+          </p:cNvPr>
+          <p:cNvSpPr>
+            <a:spLocks noGrp="1"/>
+          </p:cNvSpPr>
+          <p:nvPr>
+            <p:ph type="title"/>
+          </p:nvPr>
+        </p:nvSpPr>
+        <p:spPr/>
+        <p:txBody>
+          <a:bodyPr/>
+          <a:lstStyle/>
+          <a:p>
+            <a:r>
+              <a:rPr lang="zh-CN" altLang="en-US" dirty="0"/>
+              <a:t>公共子表达式消除</a:t>
+            </a:r>
+          </a:p>
+        </p:txBody>
+      </p:sp>
+      <mc:AlternateContent xmlns:mc="http://schemas.openxmlformats.org/markup-compatibility/2006" xmlns:a14="http://schemas.microsoft.com/office/drawing/2010/main">
+        <mc:Choice Requires="a14">
+          <p:sp>
+            <p:nvSpPr>
+              <p:cNvPr id="5" name="内容占位符 4">
+                <a:extLst>
+                  <a:ext uri="{FF2B5EF4-FFF2-40B4-BE49-F238E27FC236}">
+                    <a16:creationId xmlns:a16="http://schemas.microsoft.com/office/drawing/2014/main" id="{83D4EE28-12C0-A040-BFBF-E172397DF1D1}"/>
+                  </a:ext>
+                </a:extLst>
+              </p:cNvPr>
+              <p:cNvSpPr>
+                <a:spLocks noGrp="1"/>
+              </p:cNvSpPr>
+              <p:nvPr>
+                <p:ph sz="half" idx="1"/>
+              </p:nvPr>
+            </p:nvSpPr>
+            <p:spPr>
+              <a:xfrm>
+                <a:off x="623635" y="2924944"/>
+                <a:ext cx="10963473" cy="1211340"/>
+              </a:xfrm>
+            </p:spPr>
+            <p:txBody>
+              <a:bodyPr/>
+              <a:lstStyle/>
+              <a:p>
+                <a:pPr>
+                  <a:lnSpc>
+                    <a:spcPct val="150000"/>
+                  </a:lnSpc>
+                </a:pPr>
+                <a:r>
+                  <a:rPr lang="zh-CN" altLang="en-US" dirty="0">
+                    <a:latin typeface="Gill Sans MT" panose="020B0502020104020203" pitchFamily="34" charset="0"/>
+                  </a:rPr>
+                  <a:t>可以观察到 </a:t>
+                </a:r>
+                <a14:m>
+                  <m:oMath xmlns:m="http://schemas.openxmlformats.org/officeDocument/2006/math">
+                    <m:r>
+                      <a:rPr lang="en-US" altLang="zh-CN" i="1" dirty="0" smtClean="0">
+                        <a:latin typeface="Cambria Math" panose="02040503050406030204" pitchFamily="18" charset="0"/>
+                      </a:rPr>
+                      <m:t>𝑏</m:t>
+                    </m:r>
+                    <m:r>
+                      <a:rPr lang="en-US" altLang="zh-CN" i="1" dirty="0" smtClean="0">
+                        <a:latin typeface="Cambria Math" panose="02040503050406030204" pitchFamily="18" charset="0"/>
+                      </a:rPr>
+                      <m:t> ∗ </m:t>
+                    </m:r>
+                    <m:r>
+                      <a:rPr lang="en-US" altLang="zh-CN" i="1" dirty="0" smtClean="0">
+                        <a:latin typeface="Cambria Math" panose="02040503050406030204" pitchFamily="18" charset="0"/>
+                      </a:rPr>
+                      <m:t>𝑐</m:t>
+                    </m:r>
+                    <m:r>
+                      <a:rPr lang="en-US" altLang="zh-CN" i="1" dirty="0" smtClean="0">
+                        <a:latin typeface="Cambria Math" panose="02040503050406030204" pitchFamily="18" charset="0"/>
+                      </a:rPr>
+                      <m:t> </m:t>
+                    </m:r>
+                  </m:oMath>
+                </a14:m>
+                <a:r>
+                  <a:rPr lang="zh-CN" altLang="en-US" dirty="0">
+                    <a:latin typeface="Gill Sans MT" panose="020B0502020104020203" pitchFamily="34" charset="0"/>
+                  </a:rPr>
+                  <a:t> 是两项表达式中的公共子表达式。如果计算这个子表达式并将其计算结果存储起来的开销，低于重复计算这个子表达式的开销，则能够将以上代码转换成以下代码：</a:t>
+                </a:r>
+              </a:p>
+            </p:txBody>
+          </p:sp>
+        </mc:Choice>
+        <mc:Fallback xmlns="">
+          <p:sp>
+            <p:nvSpPr>
+              <p:cNvPr id="5" name="内容占位符 4">
+                <a:extLst>
+                  <a:ext uri="{FF2B5EF4-FFF2-40B4-BE49-F238E27FC236}">
+                    <a16:creationId xmlns:a16="http://schemas.microsoft.com/office/drawing/2014/main" id="{83D4EE28-12C0-A040-BFBF-E172397DF1D1}"/>
+                  </a:ext>
+                </a:extLst>
+              </p:cNvPr>
+              <p:cNvSpPr>
+                <a:spLocks noGrp="1" noRot="1" noChangeAspect="1" noMove="1" noResize="1" noEditPoints="1" noAdjustHandles="1" noChangeArrowheads="1" noChangeShapeType="1" noTextEdit="1"/>
+              </p:cNvSpPr>
+              <p:nvPr>
+                <p:ph sz="half" idx="1"/>
+              </p:nvPr>
+            </p:nvSpPr>
+            <p:spPr>
+              <a:xfrm>
+                <a:off x="623635" y="2924944"/>
+                <a:ext cx="10963473" cy="1211340"/>
+              </a:xfrm>
+              <a:blipFill>
+                <a:blip r:embed="rId2"/>
+                <a:stretch>
+                  <a:fillRect l="-463"/>
+                </a:stretch>
+              </a:blipFill>
+            </p:spPr>
+            <p:txBody>
+              <a:bodyPr/>
+              <a:lstStyle/>
+              <a:p>
+                <a:r>
+                  <a:rPr lang="zh-CN" altLang="en-US">
+                    <a:noFill/>
+                  </a:rPr>
+                  <a:t> </a:t>
+                </a:r>
+              </a:p>
+            </p:txBody>
+          </p:sp>
+        </mc:Fallback>
+      </mc:AlternateContent>
+      <p:pic>
+        <p:nvPicPr>
+          <p:cNvPr id="6" name="图片 5">
+            <a:extLst>
+              <a:ext uri="{FF2B5EF4-FFF2-40B4-BE49-F238E27FC236}">
+                <a16:creationId xmlns:a16="http://schemas.microsoft.com/office/drawing/2014/main" id="{59214FFE-CA35-4A4A-8770-66E859E36EE3}"/>
+              </a:ext>
+            </a:extLst>
+          </p:cNvPr>
+          <p:cNvPicPr>
+            <a:picLocks noChangeAspect="1"/>
+          </p:cNvPicPr>
+          <p:nvPr/>
+        </p:nvPicPr>
+        <p:blipFill>
+          <a:blip r:embed="rId3" cstate="screen">
+            <a:extLst>
+              <a:ext uri="{28A0092B-C50C-407E-A947-70E740481C1C}">
+                <a14:useLocalDpi xmlns:a14="http://schemas.microsoft.com/office/drawing/2010/main"/>
+              </a:ext>
+            </a:extLst>
+          </a:blip>
+          <a:stretch>
+            <a:fillRect/>
+          </a:stretch>
+        </p:blipFill>
+        <p:spPr>
+          <a:xfrm>
+            <a:off x="841797" y="1342353"/>
+            <a:ext cx="10225136" cy="1211340"/>
+          </a:xfrm>
+          <a:prstGeom prst="rect">
+            <a:avLst/>
+          </a:prstGeom>
+        </p:spPr>
+      </p:pic>
+      <p:pic>
+        <p:nvPicPr>
+          <p:cNvPr id="7" name="图片 6">
+            <a:extLst>
+              <a:ext uri="{FF2B5EF4-FFF2-40B4-BE49-F238E27FC236}">
+                <a16:creationId xmlns:a16="http://schemas.microsoft.com/office/drawing/2014/main" id="{4593D9E5-0D34-374B-A5C0-8AD47D8C5C22}"/>
+              </a:ext>
+            </a:extLst>
+          </p:cNvPr>
+          <p:cNvPicPr>
+            <a:picLocks noChangeAspect="1"/>
+          </p:cNvPicPr>
+          <p:nvPr/>
+        </p:nvPicPr>
+        <p:blipFill>
+          <a:blip r:embed="rId4" cstate="screen">
+            <a:extLst>
+              <a:ext uri="{28A0092B-C50C-407E-A947-70E740481C1C}">
+                <a14:useLocalDpi xmlns:a14="http://schemas.microsoft.com/office/drawing/2010/main"/>
+              </a:ext>
+            </a:extLst>
+          </a:blip>
+          <a:stretch>
+            <a:fillRect/>
+          </a:stretch>
+        </p:blipFill>
+        <p:spPr>
+          <a:xfrm>
+            <a:off x="841797" y="4401814"/>
+            <a:ext cx="10225136" cy="1403450"/>
+          </a:xfrm>
+          <a:prstGeom prst="rect">
+            <a:avLst/>
+          </a:prstGeom>
+        </p:spPr>
+      </p:pic>
     </p:spTree>
     <p:extLst>
       <p:ext uri="{BB962C8B-B14F-4D97-AF65-F5344CB8AC3E}">
-        <p14:creationId xmlns:p14="http://schemas.microsoft.com/office/powerpoint/2010/main" val="2327015185"/>
+        <p14:creationId xmlns:p14="http://schemas.microsoft.com/office/powerpoint/2010/main" val="763639473"/>
       </p:ext>
     </p:extLst>
   </p:cSld>
@@ -40749,7 +43593,479 @@
   </p:clrMapOvr>
   <mc:AlternateContent xmlns:mc="http://schemas.openxmlformats.org/markup-compatibility/2006" xmlns:p159="http://schemas.microsoft.com/office/powerpoint/2015/09/main">
     <mc:Choice Requires="p159">
+      <p:transition xmlns:p14="http://schemas.microsoft.com/office/powerpoint/2010/main" spd="slow" p14:dur="2000" advClick="0">
+        <p159:morph option="byObject"/>
+      </p:transition>
+    </mc:Choice>
+    <mc:Fallback xmlns="">
       <p:transition spd="slow" advClick="0">
+        <p:fade/>
+      </p:transition>
+    </mc:Fallback>
+  </mc:AlternateContent>
+</p:sld>
+</file>
+
+<file path=ppt/slides/slide8.xml><?xml version="1.0" encoding="utf-8"?>
+<p:sld xmlns:a="http://schemas.openxmlformats.org/drawingml/2006/main" xmlns:r="http://schemas.openxmlformats.org/officeDocument/2006/relationships" xmlns:p="http://schemas.openxmlformats.org/presentationml/2006/main">
+  <p:cSld>
+    <p:spTree>
+      <p:nvGrpSpPr>
+        <p:cNvPr id="1" name=""/>
+        <p:cNvGrpSpPr/>
+        <p:nvPr/>
+      </p:nvGrpSpPr>
+      <p:grpSpPr>
+        <a:xfrm>
+          <a:off x="0" y="0"/>
+          <a:ext cx="0" cy="0"/>
+          <a:chOff x="0" y="0"/>
+          <a:chExt cx="0" cy="0"/>
+        </a:xfrm>
+      </p:grpSpPr>
+      <p:sp>
+        <p:nvSpPr>
+          <p:cNvPr id="4" name="标题 3">
+            <a:extLst>
+              <a:ext uri="{FF2B5EF4-FFF2-40B4-BE49-F238E27FC236}">
+                <a16:creationId xmlns:a16="http://schemas.microsoft.com/office/drawing/2014/main" id="{3F070C18-AB22-C349-AD6A-57985058D4A3}"/>
+              </a:ext>
+            </a:extLst>
+          </p:cNvPr>
+          <p:cNvSpPr>
+            <a:spLocks noGrp="1"/>
+          </p:cNvSpPr>
+          <p:nvPr>
+            <p:ph type="title"/>
+          </p:nvPr>
+        </p:nvSpPr>
+        <p:spPr/>
+        <p:txBody>
+          <a:bodyPr/>
+          <a:lstStyle/>
+          <a:p>
+            <a:r>
+              <a:rPr lang="en-US" altLang="zh-CN" dirty="0"/>
+              <a:t>Principle</a:t>
+            </a:r>
+            <a:endParaRPr lang="zh-CN" altLang="en-US" dirty="0"/>
+          </a:p>
+        </p:txBody>
+      </p:sp>
+      <mc:AlternateContent xmlns:mc="http://schemas.openxmlformats.org/markup-compatibility/2006" xmlns:a14="http://schemas.microsoft.com/office/drawing/2010/main">
+        <mc:Choice Requires="a14">
+          <p:sp>
+            <p:nvSpPr>
+              <p:cNvPr id="5" name="内容占位符 4">
+                <a:extLst>
+                  <a:ext uri="{FF2B5EF4-FFF2-40B4-BE49-F238E27FC236}">
+                    <a16:creationId xmlns:a16="http://schemas.microsoft.com/office/drawing/2014/main" id="{83D4EE28-12C0-A040-BFBF-E172397DF1D1}"/>
+                  </a:ext>
+                </a:extLst>
+              </p:cNvPr>
+              <p:cNvSpPr>
+                <a:spLocks noGrp="1"/>
+              </p:cNvSpPr>
+              <p:nvPr>
+                <p:ph sz="half" idx="1"/>
+              </p:nvPr>
+            </p:nvSpPr>
+            <p:spPr>
+              <a:xfrm>
+                <a:off x="623635" y="1556792"/>
+                <a:ext cx="10963473" cy="4464496"/>
+              </a:xfrm>
+            </p:spPr>
+            <p:txBody>
+              <a:bodyPr/>
+              <a:lstStyle/>
+              <a:p>
+                <a:pPr marL="0" indent="0">
+                  <a:lnSpc>
+                    <a:spcPct val="150000"/>
+                  </a:lnSpc>
+                  <a:buNone/>
+                </a:pPr>
+                <a:r>
+                  <a:rPr lang="zh-CN" altLang="en-US" dirty="0"/>
+                  <a:t>执行这项优化的可能性基于表达式的定义可达性。当以下条件成立，则一个表达式 </a:t>
+                </a:r>
+                <a14:m>
+                  <m:oMath xmlns:m="http://schemas.openxmlformats.org/officeDocument/2006/math">
+                    <m:r>
+                      <a:rPr lang="en-US" altLang="zh-CN" i="1" dirty="0" smtClean="0">
+                        <a:latin typeface="Cambria Math" panose="02040503050406030204" pitchFamily="18" charset="0"/>
+                      </a:rPr>
+                      <m:t>𝑏</m:t>
+                    </m:r>
+                    <m:r>
+                      <a:rPr lang="en-US" altLang="zh-CN" i="1" dirty="0">
+                        <a:latin typeface="Cambria Math" panose="02040503050406030204" pitchFamily="18" charset="0"/>
+                      </a:rPr>
+                      <m:t>∗</m:t>
+                    </m:r>
+                    <m:r>
+                      <a:rPr lang="en-US" altLang="zh-CN" i="1" dirty="0" smtClean="0">
+                        <a:latin typeface="Cambria Math" panose="02040503050406030204" pitchFamily="18" charset="0"/>
+                      </a:rPr>
+                      <m:t>𝑐</m:t>
+                    </m:r>
+                  </m:oMath>
+                </a14:m>
+                <a:r>
+                  <a:rPr lang="en-US" altLang="zh-CN" dirty="0"/>
+                  <a:t> </a:t>
+                </a:r>
+                <a:r>
+                  <a:rPr lang="zh-CN" altLang="en-US" dirty="0"/>
+                  <a:t>在程序的某个点  </a:t>
+                </a:r>
+                <a14:m>
+                  <m:oMath xmlns:m="http://schemas.openxmlformats.org/officeDocument/2006/math">
+                    <m:r>
+                      <a:rPr lang="en-US" altLang="zh-CN" i="1" dirty="0" smtClean="0">
+                        <a:latin typeface="Cambria Math" panose="02040503050406030204" pitchFamily="18" charset="0"/>
+                      </a:rPr>
+                      <m:t>𝑝</m:t>
+                    </m:r>
+                  </m:oMath>
+                </a14:m>
+                <a:r>
+                  <a:rPr lang="en-US" altLang="zh-CN" dirty="0"/>
+                  <a:t> </a:t>
+                </a:r>
+                <a:r>
+                  <a:rPr lang="zh-CN" altLang="en-US" dirty="0"/>
+                  <a:t>被定义为是可达的：</a:t>
+                </a:r>
+                <a:endParaRPr lang="en-US" altLang="zh-CN" dirty="0"/>
+              </a:p>
+              <a:p>
+                <a:pPr>
+                  <a:lnSpc>
+                    <a:spcPct val="150000"/>
+                  </a:lnSpc>
+                </a:pPr>
+                <a:r>
+                  <a:rPr lang="zh-CN" altLang="en-US" dirty="0"/>
+                  <a:t>从初始节点到点 </a:t>
+                </a:r>
+                <a14:m>
+                  <m:oMath xmlns:m="http://schemas.openxmlformats.org/officeDocument/2006/math">
+                    <m:r>
+                      <a:rPr lang="en-US" altLang="zh-CN" i="1" dirty="0" smtClean="0">
+                        <a:latin typeface="Cambria Math" panose="02040503050406030204" pitchFamily="18" charset="0"/>
+                      </a:rPr>
+                      <m:t>𝑝</m:t>
+                    </m:r>
+                  </m:oMath>
+                </a14:m>
+                <a:r>
+                  <a:rPr lang="zh-CN" altLang="en-US" dirty="0"/>
+                  <a:t> 的每条路径在到达 </a:t>
+                </a:r>
+                <a14:m>
+                  <m:oMath xmlns:m="http://schemas.openxmlformats.org/officeDocument/2006/math">
+                    <m:r>
+                      <a:rPr lang="en-US" altLang="zh-CN" i="1" dirty="0" smtClean="0">
+                        <a:latin typeface="Cambria Math" panose="02040503050406030204" pitchFamily="18" charset="0"/>
+                      </a:rPr>
+                      <m:t>𝑝</m:t>
+                    </m:r>
+                  </m:oMath>
+                </a14:m>
+                <a:r>
+                  <a:rPr lang="zh-CN" altLang="en-US" dirty="0"/>
+                  <a:t> 之前计算过 </a:t>
+                </a:r>
+                <a14:m>
+                  <m:oMath xmlns:m="http://schemas.openxmlformats.org/officeDocument/2006/math">
+                    <m:r>
+                      <a:rPr lang="en-US" altLang="zh-CN" i="1" dirty="0" smtClean="0">
+                        <a:latin typeface="Cambria Math" panose="02040503050406030204" pitchFamily="18" charset="0"/>
+                      </a:rPr>
+                      <m:t>𝑏</m:t>
+                    </m:r>
+                    <m:r>
+                      <a:rPr lang="en-US" altLang="zh-CN" i="1" dirty="0" smtClean="0">
+                        <a:latin typeface="Cambria Math" panose="02040503050406030204" pitchFamily="18" charset="0"/>
+                      </a:rPr>
+                      <m:t>∗</m:t>
+                    </m:r>
+                    <m:r>
+                      <a:rPr lang="en-US" altLang="zh-CN" i="1" dirty="0" smtClean="0">
+                        <a:latin typeface="Cambria Math" panose="02040503050406030204" pitchFamily="18" charset="0"/>
+                      </a:rPr>
+                      <m:t>𝑐</m:t>
+                    </m:r>
+                  </m:oMath>
+                </a14:m>
+                <a:r>
+                  <a:rPr lang="en-US" altLang="zh-CN" dirty="0"/>
+                  <a:t> </a:t>
+                </a:r>
+                <a:r>
+                  <a:rPr lang="zh-CN" altLang="en-US" dirty="0"/>
+                  <a:t>；</a:t>
+                </a:r>
+                <a:endParaRPr lang="en-US" altLang="zh-CN" dirty="0"/>
+              </a:p>
+              <a:p>
+                <a:pPr>
+                  <a:lnSpc>
+                    <a:spcPct val="150000"/>
+                  </a:lnSpc>
+                </a:pPr>
+                <a14:m>
+                  <m:oMath xmlns:m="http://schemas.openxmlformats.org/officeDocument/2006/math">
+                    <m:r>
+                      <a:rPr lang="en-US" altLang="zh-CN" i="1" dirty="0" smtClean="0">
+                        <a:latin typeface="Cambria Math" panose="02040503050406030204" pitchFamily="18" charset="0"/>
+                      </a:rPr>
+                      <m:t>𝑏</m:t>
+                    </m:r>
+                    <m:r>
+                      <a:rPr lang="en-US" altLang="zh-CN" i="1" dirty="0" smtClean="0">
+                        <a:latin typeface="Cambria Math" panose="02040503050406030204" pitchFamily="18" charset="0"/>
+                      </a:rPr>
+                      <m:t>∗</m:t>
+                    </m:r>
+                    <m:r>
+                      <a:rPr lang="en-US" altLang="zh-CN" i="1" dirty="0" smtClean="0">
+                        <a:latin typeface="Cambria Math" panose="02040503050406030204" pitchFamily="18" charset="0"/>
+                      </a:rPr>
+                      <m:t>𝑐</m:t>
+                    </m:r>
+                  </m:oMath>
+                </a14:m>
+                <a:r>
+                  <a:rPr lang="zh-CN" altLang="en-US" dirty="0"/>
+                  <a:t> 被计算后，无论 </a:t>
+                </a:r>
+                <a14:m>
+                  <m:oMath xmlns:m="http://schemas.openxmlformats.org/officeDocument/2006/math">
+                    <m:r>
+                      <a:rPr lang="en-US" altLang="zh-CN" i="1" dirty="0" smtClean="0">
+                        <a:latin typeface="Cambria Math" panose="02040503050406030204" pitchFamily="18" charset="0"/>
+                      </a:rPr>
+                      <m:t>𝑏</m:t>
+                    </m:r>
+                  </m:oMath>
+                </a14:m>
+                <a:r>
+                  <a:rPr lang="zh-CN" altLang="en-US" dirty="0"/>
+                  <a:t> 或者 </a:t>
+                </a:r>
+                <a14:m>
+                  <m:oMath xmlns:m="http://schemas.openxmlformats.org/officeDocument/2006/math">
+                    <m:r>
+                      <a:rPr lang="en-US" altLang="zh-CN" i="1" dirty="0" smtClean="0">
+                        <a:latin typeface="Cambria Math" panose="02040503050406030204" pitchFamily="18" charset="0"/>
+                      </a:rPr>
+                      <m:t>𝑐</m:t>
+                    </m:r>
+                  </m:oMath>
+                </a14:m>
+                <a:r>
+                  <a:rPr lang="zh-CN" altLang="en-US" dirty="0"/>
+                  <a:t> 到达 </a:t>
+                </a:r>
+                <a14:m>
+                  <m:oMath xmlns:m="http://schemas.openxmlformats.org/officeDocument/2006/math">
+                    <m:r>
+                      <a:rPr lang="en-US" altLang="zh-CN" i="1" dirty="0" smtClean="0">
+                        <a:latin typeface="Cambria Math" panose="02040503050406030204" pitchFamily="18" charset="0"/>
+                      </a:rPr>
+                      <m:t>𝑝</m:t>
+                    </m:r>
+                  </m:oMath>
+                </a14:m>
+                <a:r>
+                  <a:rPr lang="zh-CN" altLang="en-US" dirty="0"/>
+                  <a:t> 以前都没有被重新赋值过；</a:t>
+                </a:r>
+                <a:endParaRPr lang="en-US" altLang="zh-CN" dirty="0"/>
+              </a:p>
+              <a:p>
+                <a:pPr>
+                  <a:lnSpc>
+                    <a:spcPct val="150000"/>
+                  </a:lnSpc>
+                </a:pPr>
+                <a:endParaRPr lang="en-US" altLang="zh-CN" dirty="0"/>
+              </a:p>
+              <a:p>
+                <a:pPr>
+                  <a:lnSpc>
+                    <a:spcPct val="150000"/>
+                  </a:lnSpc>
+                </a:pPr>
+                <a:endParaRPr lang="en-US" altLang="zh-CN" dirty="0"/>
+              </a:p>
+            </p:txBody>
+          </p:sp>
+        </mc:Choice>
+        <mc:Fallback xmlns="">
+          <p:sp>
+            <p:nvSpPr>
+              <p:cNvPr id="5" name="内容占位符 4">
+                <a:extLst>
+                  <a:ext uri="{FF2B5EF4-FFF2-40B4-BE49-F238E27FC236}">
+                    <a16:creationId xmlns:a16="http://schemas.microsoft.com/office/drawing/2014/main" id="{83D4EE28-12C0-A040-BFBF-E172397DF1D1}"/>
+                  </a:ext>
+                </a:extLst>
+              </p:cNvPr>
+              <p:cNvSpPr>
+                <a:spLocks noGrp="1" noRot="1" noChangeAspect="1" noMove="1" noResize="1" noEditPoints="1" noAdjustHandles="1" noChangeArrowheads="1" noChangeShapeType="1" noTextEdit="1"/>
+              </p:cNvSpPr>
+              <p:nvPr>
+                <p:ph sz="half" idx="1"/>
+              </p:nvPr>
+            </p:nvSpPr>
+            <p:spPr>
+              <a:xfrm>
+                <a:off x="623635" y="1556792"/>
+                <a:ext cx="10963473" cy="4464496"/>
+              </a:xfrm>
+              <a:blipFill>
+                <a:blip r:embed="rId2"/>
+                <a:stretch>
+                  <a:fillRect l="-579"/>
+                </a:stretch>
+              </a:blipFill>
+            </p:spPr>
+            <p:txBody>
+              <a:bodyPr/>
+              <a:lstStyle/>
+              <a:p>
+                <a:r>
+                  <a:rPr lang="zh-CN" altLang="en-US">
+                    <a:noFill/>
+                  </a:rPr>
+                  <a:t> </a:t>
+                </a:r>
+              </a:p>
+            </p:txBody>
+          </p:sp>
+        </mc:Fallback>
+      </mc:AlternateContent>
+    </p:spTree>
+    <p:extLst>
+      <p:ext uri="{BB962C8B-B14F-4D97-AF65-F5344CB8AC3E}">
+        <p14:creationId xmlns:p14="http://schemas.microsoft.com/office/powerpoint/2010/main" val="598591539"/>
+      </p:ext>
+    </p:extLst>
+  </p:cSld>
+  <p:clrMapOvr>
+    <a:masterClrMapping/>
+  </p:clrMapOvr>
+  <mc:AlternateContent xmlns:mc="http://schemas.openxmlformats.org/markup-compatibility/2006" xmlns:p159="http://schemas.microsoft.com/office/powerpoint/2015/09/main">
+    <mc:Choice Requires="p159">
+      <p:transition xmlns:p14="http://schemas.microsoft.com/office/powerpoint/2010/main" spd="slow" p14:dur="2000" advClick="0">
+        <p159:morph option="byObject"/>
+      </p:transition>
+    </mc:Choice>
+    <mc:Fallback xmlns="">
+      <p:transition spd="slow" advClick="0">
+        <p:fade/>
+      </p:transition>
+    </mc:Fallback>
+  </mc:AlternateContent>
+</p:sld>
+</file>
+
+<file path=ppt/slides/slide9.xml><?xml version="1.0" encoding="utf-8"?>
+<p:sld xmlns:a="http://schemas.openxmlformats.org/drawingml/2006/main" xmlns:r="http://schemas.openxmlformats.org/officeDocument/2006/relationships" xmlns:p="http://schemas.openxmlformats.org/presentationml/2006/main">
+  <p:cSld>
+    <p:spTree>
+      <p:nvGrpSpPr>
+        <p:cNvPr id="1" name=""/>
+        <p:cNvGrpSpPr/>
+        <p:nvPr/>
+      </p:nvGrpSpPr>
+      <p:grpSpPr>
+        <a:xfrm>
+          <a:off x="0" y="0"/>
+          <a:ext cx="0" cy="0"/>
+          <a:chOff x="0" y="0"/>
+          <a:chExt cx="0" cy="0"/>
+        </a:xfrm>
+      </p:grpSpPr>
+      <p:sp>
+        <p:nvSpPr>
+          <p:cNvPr id="2" name="标题 1">
+            <a:extLst>
+              <a:ext uri="{FF2B5EF4-FFF2-40B4-BE49-F238E27FC236}">
+                <a16:creationId xmlns:a16="http://schemas.microsoft.com/office/drawing/2014/main" id="{171BCD31-4A83-0445-A16D-F52895684121}"/>
+              </a:ext>
+            </a:extLst>
+          </p:cNvPr>
+          <p:cNvSpPr>
+            <a:spLocks noGrp="1"/>
+          </p:cNvSpPr>
+          <p:nvPr>
+            <p:ph type="title"/>
+          </p:nvPr>
+        </p:nvSpPr>
+        <p:spPr/>
+        <p:txBody>
+          <a:bodyPr/>
+          <a:lstStyle/>
+          <a:p>
+            <a:r>
+              <a:rPr lang="en-US" altLang="zh-CN" dirty="0"/>
+              <a:t>Principle</a:t>
+            </a:r>
+            <a:endParaRPr kumimoji="1" lang="zh-CN" altLang="en-US" dirty="0"/>
+          </a:p>
+        </p:txBody>
+      </p:sp>
+      <p:sp>
+        <p:nvSpPr>
+          <p:cNvPr id="3" name="内容占位符 2">
+            <a:extLst>
+              <a:ext uri="{FF2B5EF4-FFF2-40B4-BE49-F238E27FC236}">
+                <a16:creationId xmlns:a16="http://schemas.microsoft.com/office/drawing/2014/main" id="{6FDFF631-2E5C-4548-A4CA-5842368BDB02}"/>
+              </a:ext>
+            </a:extLst>
+          </p:cNvPr>
+          <p:cNvSpPr>
+            <a:spLocks noGrp="1"/>
+          </p:cNvSpPr>
+          <p:nvPr>
+            <p:ph sz="half" idx="1"/>
+          </p:nvPr>
+        </p:nvSpPr>
+        <p:spPr/>
+        <p:txBody>
+          <a:bodyPr/>
+          <a:lstStyle/>
+          <a:p>
+            <a:pPr>
+              <a:lnSpc>
+                <a:spcPct val="150000"/>
+              </a:lnSpc>
+            </a:pPr>
+            <a:r>
+              <a:rPr lang="zh-CN" altLang="en-US" dirty="0"/>
+              <a:t>由编译器计算的成本效益分析可以判断出，重复计算该表达式的开销是否大于存储该表达式的计算结果，并且这个分析也要将寄存器等因素考虑在内。</a:t>
+            </a:r>
+          </a:p>
+        </p:txBody>
+      </p:sp>
+    </p:spTree>
+    <p:extLst>
+      <p:ext uri="{BB962C8B-B14F-4D97-AF65-F5344CB8AC3E}">
+        <p14:creationId xmlns:p14="http://schemas.microsoft.com/office/powerpoint/2010/main" val="723219683"/>
+      </p:ext>
+    </p:extLst>
+  </p:cSld>
+  <p:clrMapOvr>
+    <a:masterClrMapping/>
+  </p:clrMapOvr>
+  <mc:AlternateContent xmlns:mc="http://schemas.openxmlformats.org/markup-compatibility/2006" xmlns:p159="http://schemas.microsoft.com/office/powerpoint/2015/09/main">
+    <mc:Choice Requires="p159">
+      <p:transition xmlns:p14="http://schemas.microsoft.com/office/powerpoint/2010/main" spd="slow" p14:dur="2000" advClick="0">
         <p159:morph option="byObject"/>
       </p:transition>
     </mc:Choice>

</xml_diff>